<commit_message>
Update 1 ao 15
</commit_message>
<xml_diff>
--- a/artefatos/15. Arquitetura de Negócio para cada Cenário.pptx
+++ b/artefatos/15. Arquitetura de Negócio para cada Cenário.pptx
@@ -119,6 +119,33 @@
 </p:presentation>
 </file>
 
+<file path=ppt/ink/ink1.xml><?xml version="1.0" encoding="utf-8"?>
+<inkml:ink xmlns:inkml="http://www.w3.org/2003/InkML">
+  <inkml:definitions>
+    <inkml:context xml:id="ctx0">
+      <inkml:inkSource xml:id="inkSrc0">
+        <inkml:traceFormat>
+          <inkml:channel name="X" type="integer" min="-2.14748E9" max="2.14748E9" units="cm"/>
+          <inkml:channel name="Y" type="integer" min="-2.14748E9" max="2.14748E9" units="cm"/>
+        </inkml:traceFormat>
+        <inkml:channelProperties>
+          <inkml:channelProperty channel="X" name="resolution" value="1000" units="1/cm"/>
+          <inkml:channelProperty channel="Y" name="resolution" value="1000" units="1/cm"/>
+        </inkml:channelProperties>
+      </inkml:inkSource>
+      <inkml:timestamp xml:id="ts0" timeString="2021-05-24T12:55:08.182"/>
+    </inkml:context>
+    <inkml:brush xml:id="br0">
+      <inkml:brushProperty name="width" value="0.05" units="cm"/>
+      <inkml:brushProperty name="height" value="0.05" units="cm"/>
+      <inkml:brushProperty name="color" value="#FF0066"/>
+      <inkml:brushProperty name="ignorePressure" value="1"/>
+    </inkml:brush>
+  </inkml:definitions>
+  <inkml:trace contextRef="#ctx0" brushRef="#br0">0 0,'0'0</inkml:trace>
+</inkml:ink>
+</file>
+
 <file path=ppt/slideLayouts/slideLayout1.xml><?xml version="1.0" encoding="utf-8"?>
 <p:sldLayout xmlns:a="http://schemas.openxmlformats.org/drawingml/2006/main" xmlns:r="http://schemas.openxmlformats.org/officeDocument/2006/relationships" xmlns:p="http://schemas.openxmlformats.org/presentationml/2006/main" type="title" preserve="1">
   <p:cSld name="Slide de Título">
@@ -141,7 +168,7 @@
           <p:cNvPr id="2" name="Título 1">
             <a:extLst>
               <a:ext uri="{FF2B5EF4-FFF2-40B4-BE49-F238E27FC236}">
-                <a16:creationId xmlns="" xmlns:a16="http://schemas.microsoft.com/office/drawing/2014/main" id="{32F0F680-0DCD-48DC-9019-2D73609FCDB2}"/>
+                <a16:creationId xmlns:a16="http://schemas.microsoft.com/office/drawing/2014/main" xmlns="" id="{32F0F680-0DCD-48DC-9019-2D73609FCDB2}"/>
               </a:ext>
             </a:extLst>
           </p:cNvPr>
@@ -178,7 +205,7 @@
           <p:cNvPr id="3" name="Subtítulo 2">
             <a:extLst>
               <a:ext uri="{FF2B5EF4-FFF2-40B4-BE49-F238E27FC236}">
-                <a16:creationId xmlns="" xmlns:a16="http://schemas.microsoft.com/office/drawing/2014/main" id="{17F2B2EB-E4EF-4AF3-BF78-C3CBAAE74754}"/>
+                <a16:creationId xmlns:a16="http://schemas.microsoft.com/office/drawing/2014/main" xmlns="" id="{17F2B2EB-E4EF-4AF3-BF78-C3CBAAE74754}"/>
               </a:ext>
             </a:extLst>
           </p:cNvPr>
@@ -248,7 +275,7 @@
           <p:cNvPr id="4" name="Espaço Reservado para Data 3">
             <a:extLst>
               <a:ext uri="{FF2B5EF4-FFF2-40B4-BE49-F238E27FC236}">
-                <a16:creationId xmlns="" xmlns:a16="http://schemas.microsoft.com/office/drawing/2014/main" id="{825EAE16-EA10-4ED5-89F8-FC97E17E7DAD}"/>
+                <a16:creationId xmlns:a16="http://schemas.microsoft.com/office/drawing/2014/main" xmlns="" id="{825EAE16-EA10-4ED5-89F8-FC97E17E7DAD}"/>
               </a:ext>
             </a:extLst>
           </p:cNvPr>
@@ -266,7 +293,7 @@
           <a:p>
             <a:fld id="{8534D01F-854E-4A4D-8288-8E2FDA9CA879}" type="datetimeFigureOut">
               <a:rPr lang="pt-BR" smtClean="0"/>
-              <a:t>25/03/2021</a:t>
+              <a:t>27/05/2021</a:t>
             </a:fld>
             <a:endParaRPr lang="pt-BR"/>
           </a:p>
@@ -277,7 +304,7 @@
           <p:cNvPr id="5" name="Espaço Reservado para Rodapé 4">
             <a:extLst>
               <a:ext uri="{FF2B5EF4-FFF2-40B4-BE49-F238E27FC236}">
-                <a16:creationId xmlns="" xmlns:a16="http://schemas.microsoft.com/office/drawing/2014/main" id="{6BCAA4E7-F39C-4EB9-8176-9C2AEA2C33E6}"/>
+                <a16:creationId xmlns:a16="http://schemas.microsoft.com/office/drawing/2014/main" xmlns="" id="{6BCAA4E7-F39C-4EB9-8176-9C2AEA2C33E6}"/>
               </a:ext>
             </a:extLst>
           </p:cNvPr>
@@ -302,7 +329,7 @@
           <p:cNvPr id="6" name="Espaço Reservado para Número de Slide 5">
             <a:extLst>
               <a:ext uri="{FF2B5EF4-FFF2-40B4-BE49-F238E27FC236}">
-                <a16:creationId xmlns="" xmlns:a16="http://schemas.microsoft.com/office/drawing/2014/main" id="{FC39B9D8-F780-4D92-8593-373AD9F08496}"/>
+                <a16:creationId xmlns:a16="http://schemas.microsoft.com/office/drawing/2014/main" xmlns="" id="{FC39B9D8-F780-4D92-8593-373AD9F08496}"/>
               </a:ext>
             </a:extLst>
           </p:cNvPr>
@@ -361,7 +388,7 @@
           <p:cNvPr id="2" name="Título 1">
             <a:extLst>
               <a:ext uri="{FF2B5EF4-FFF2-40B4-BE49-F238E27FC236}">
-                <a16:creationId xmlns="" xmlns:a16="http://schemas.microsoft.com/office/drawing/2014/main" id="{5B7F6DF8-D789-496D-B820-240404E2CA84}"/>
+                <a16:creationId xmlns:a16="http://schemas.microsoft.com/office/drawing/2014/main" xmlns="" id="{5B7F6DF8-D789-496D-B820-240404E2CA84}"/>
               </a:ext>
             </a:extLst>
           </p:cNvPr>
@@ -389,7 +416,7 @@
           <p:cNvPr id="3" name="Espaço Reservado para Texto Vertical 2">
             <a:extLst>
               <a:ext uri="{FF2B5EF4-FFF2-40B4-BE49-F238E27FC236}">
-                <a16:creationId xmlns="" xmlns:a16="http://schemas.microsoft.com/office/drawing/2014/main" id="{E7C4C555-F52D-4ED9-BFD3-875BA623CBB7}"/>
+                <a16:creationId xmlns:a16="http://schemas.microsoft.com/office/drawing/2014/main" xmlns="" id="{E7C4C555-F52D-4ED9-BFD3-875BA623CBB7}"/>
               </a:ext>
             </a:extLst>
           </p:cNvPr>
@@ -446,7 +473,7 @@
           <p:cNvPr id="4" name="Espaço Reservado para Data 3">
             <a:extLst>
               <a:ext uri="{FF2B5EF4-FFF2-40B4-BE49-F238E27FC236}">
-                <a16:creationId xmlns="" xmlns:a16="http://schemas.microsoft.com/office/drawing/2014/main" id="{EAB65129-6044-4A46-853C-756C7D7AF98E}"/>
+                <a16:creationId xmlns:a16="http://schemas.microsoft.com/office/drawing/2014/main" xmlns="" id="{EAB65129-6044-4A46-853C-756C7D7AF98E}"/>
               </a:ext>
             </a:extLst>
           </p:cNvPr>
@@ -464,7 +491,7 @@
           <a:p>
             <a:fld id="{8534D01F-854E-4A4D-8288-8E2FDA9CA879}" type="datetimeFigureOut">
               <a:rPr lang="pt-BR" smtClean="0"/>
-              <a:t>25/03/2021</a:t>
+              <a:t>27/05/2021</a:t>
             </a:fld>
             <a:endParaRPr lang="pt-BR"/>
           </a:p>
@@ -475,7 +502,7 @@
           <p:cNvPr id="5" name="Espaço Reservado para Rodapé 4">
             <a:extLst>
               <a:ext uri="{FF2B5EF4-FFF2-40B4-BE49-F238E27FC236}">
-                <a16:creationId xmlns="" xmlns:a16="http://schemas.microsoft.com/office/drawing/2014/main" id="{EEA5ADEC-881D-4E4F-8C21-03D821E658F8}"/>
+                <a16:creationId xmlns:a16="http://schemas.microsoft.com/office/drawing/2014/main" xmlns="" id="{EEA5ADEC-881D-4E4F-8C21-03D821E658F8}"/>
               </a:ext>
             </a:extLst>
           </p:cNvPr>
@@ -500,7 +527,7 @@
           <p:cNvPr id="6" name="Espaço Reservado para Número de Slide 5">
             <a:extLst>
               <a:ext uri="{FF2B5EF4-FFF2-40B4-BE49-F238E27FC236}">
-                <a16:creationId xmlns="" xmlns:a16="http://schemas.microsoft.com/office/drawing/2014/main" id="{7050D737-D7C8-44A9-B8D5-A3B112DAF24E}"/>
+                <a16:creationId xmlns:a16="http://schemas.microsoft.com/office/drawing/2014/main" xmlns="" id="{7050D737-D7C8-44A9-B8D5-A3B112DAF24E}"/>
               </a:ext>
             </a:extLst>
           </p:cNvPr>
@@ -559,7 +586,7 @@
           <p:cNvPr id="2" name="Título Vertical 1">
             <a:extLst>
               <a:ext uri="{FF2B5EF4-FFF2-40B4-BE49-F238E27FC236}">
-                <a16:creationId xmlns="" xmlns:a16="http://schemas.microsoft.com/office/drawing/2014/main" id="{AA6D4FEC-69DD-4F62-BA95-D0CE29599C8A}"/>
+                <a16:creationId xmlns:a16="http://schemas.microsoft.com/office/drawing/2014/main" xmlns="" id="{AA6D4FEC-69DD-4F62-BA95-D0CE29599C8A}"/>
               </a:ext>
             </a:extLst>
           </p:cNvPr>
@@ -592,7 +619,7 @@
           <p:cNvPr id="3" name="Espaço Reservado para Texto Vertical 2">
             <a:extLst>
               <a:ext uri="{FF2B5EF4-FFF2-40B4-BE49-F238E27FC236}">
-                <a16:creationId xmlns="" xmlns:a16="http://schemas.microsoft.com/office/drawing/2014/main" id="{8A62FC94-A7B2-4DC9-8AD2-98364C6487E4}"/>
+                <a16:creationId xmlns:a16="http://schemas.microsoft.com/office/drawing/2014/main" xmlns="" id="{8A62FC94-A7B2-4DC9-8AD2-98364C6487E4}"/>
               </a:ext>
             </a:extLst>
           </p:cNvPr>
@@ -654,7 +681,7 @@
           <p:cNvPr id="4" name="Espaço Reservado para Data 3">
             <a:extLst>
               <a:ext uri="{FF2B5EF4-FFF2-40B4-BE49-F238E27FC236}">
-                <a16:creationId xmlns="" xmlns:a16="http://schemas.microsoft.com/office/drawing/2014/main" id="{F960D424-500C-47FD-984A-859A63E0EA41}"/>
+                <a16:creationId xmlns:a16="http://schemas.microsoft.com/office/drawing/2014/main" xmlns="" id="{F960D424-500C-47FD-984A-859A63E0EA41}"/>
               </a:ext>
             </a:extLst>
           </p:cNvPr>
@@ -672,7 +699,7 @@
           <a:p>
             <a:fld id="{8534D01F-854E-4A4D-8288-8E2FDA9CA879}" type="datetimeFigureOut">
               <a:rPr lang="pt-BR" smtClean="0"/>
-              <a:t>25/03/2021</a:t>
+              <a:t>27/05/2021</a:t>
             </a:fld>
             <a:endParaRPr lang="pt-BR"/>
           </a:p>
@@ -683,7 +710,7 @@
           <p:cNvPr id="5" name="Espaço Reservado para Rodapé 4">
             <a:extLst>
               <a:ext uri="{FF2B5EF4-FFF2-40B4-BE49-F238E27FC236}">
-                <a16:creationId xmlns="" xmlns:a16="http://schemas.microsoft.com/office/drawing/2014/main" id="{8CA9E1D0-1763-4AC9-96A4-611C0C809DB2}"/>
+                <a16:creationId xmlns:a16="http://schemas.microsoft.com/office/drawing/2014/main" xmlns="" id="{8CA9E1D0-1763-4AC9-96A4-611C0C809DB2}"/>
               </a:ext>
             </a:extLst>
           </p:cNvPr>
@@ -708,7 +735,7 @@
           <p:cNvPr id="6" name="Espaço Reservado para Número de Slide 5">
             <a:extLst>
               <a:ext uri="{FF2B5EF4-FFF2-40B4-BE49-F238E27FC236}">
-                <a16:creationId xmlns="" xmlns:a16="http://schemas.microsoft.com/office/drawing/2014/main" id="{48CE5E30-BC91-4F2A-A124-6944CE7913D8}"/>
+                <a16:creationId xmlns:a16="http://schemas.microsoft.com/office/drawing/2014/main" xmlns="" id="{48CE5E30-BC91-4F2A-A124-6944CE7913D8}"/>
               </a:ext>
             </a:extLst>
           </p:cNvPr>
@@ -767,7 +794,7 @@
           <p:cNvPr id="2" name="Título 1">
             <a:extLst>
               <a:ext uri="{FF2B5EF4-FFF2-40B4-BE49-F238E27FC236}">
-                <a16:creationId xmlns="" xmlns:a16="http://schemas.microsoft.com/office/drawing/2014/main" id="{97E22BE5-4727-4790-B9CC-6420327C565A}"/>
+                <a16:creationId xmlns:a16="http://schemas.microsoft.com/office/drawing/2014/main" xmlns="" id="{97E22BE5-4727-4790-B9CC-6420327C565A}"/>
               </a:ext>
             </a:extLst>
           </p:cNvPr>
@@ -795,7 +822,7 @@
           <p:cNvPr id="3" name="Espaço Reservado para Conteúdo 2">
             <a:extLst>
               <a:ext uri="{FF2B5EF4-FFF2-40B4-BE49-F238E27FC236}">
-                <a16:creationId xmlns="" xmlns:a16="http://schemas.microsoft.com/office/drawing/2014/main" id="{C79FCA74-5ADF-4A07-9DED-65046E971A8A}"/>
+                <a16:creationId xmlns:a16="http://schemas.microsoft.com/office/drawing/2014/main" xmlns="" id="{C79FCA74-5ADF-4A07-9DED-65046E971A8A}"/>
               </a:ext>
             </a:extLst>
           </p:cNvPr>
@@ -852,7 +879,7 @@
           <p:cNvPr id="4" name="Espaço Reservado para Data 3">
             <a:extLst>
               <a:ext uri="{FF2B5EF4-FFF2-40B4-BE49-F238E27FC236}">
-                <a16:creationId xmlns="" xmlns:a16="http://schemas.microsoft.com/office/drawing/2014/main" id="{DBE612CA-2556-4594-A5C6-7B34F12A423C}"/>
+                <a16:creationId xmlns:a16="http://schemas.microsoft.com/office/drawing/2014/main" xmlns="" id="{DBE612CA-2556-4594-A5C6-7B34F12A423C}"/>
               </a:ext>
             </a:extLst>
           </p:cNvPr>
@@ -870,7 +897,7 @@
           <a:p>
             <a:fld id="{8534D01F-854E-4A4D-8288-8E2FDA9CA879}" type="datetimeFigureOut">
               <a:rPr lang="pt-BR" smtClean="0"/>
-              <a:t>25/03/2021</a:t>
+              <a:t>27/05/2021</a:t>
             </a:fld>
             <a:endParaRPr lang="pt-BR"/>
           </a:p>
@@ -881,7 +908,7 @@
           <p:cNvPr id="5" name="Espaço Reservado para Rodapé 4">
             <a:extLst>
               <a:ext uri="{FF2B5EF4-FFF2-40B4-BE49-F238E27FC236}">
-                <a16:creationId xmlns="" xmlns:a16="http://schemas.microsoft.com/office/drawing/2014/main" id="{620F25C6-4916-41D3-9475-6342F099BA67}"/>
+                <a16:creationId xmlns:a16="http://schemas.microsoft.com/office/drawing/2014/main" xmlns="" id="{620F25C6-4916-41D3-9475-6342F099BA67}"/>
               </a:ext>
             </a:extLst>
           </p:cNvPr>
@@ -906,7 +933,7 @@
           <p:cNvPr id="6" name="Espaço Reservado para Número de Slide 5">
             <a:extLst>
               <a:ext uri="{FF2B5EF4-FFF2-40B4-BE49-F238E27FC236}">
-                <a16:creationId xmlns="" xmlns:a16="http://schemas.microsoft.com/office/drawing/2014/main" id="{C46BA90F-325E-47EA-8832-FA49406DEC5E}"/>
+                <a16:creationId xmlns:a16="http://schemas.microsoft.com/office/drawing/2014/main" xmlns="" id="{C46BA90F-325E-47EA-8832-FA49406DEC5E}"/>
               </a:ext>
             </a:extLst>
           </p:cNvPr>
@@ -965,7 +992,7 @@
           <p:cNvPr id="2" name="Título 1">
             <a:extLst>
               <a:ext uri="{FF2B5EF4-FFF2-40B4-BE49-F238E27FC236}">
-                <a16:creationId xmlns="" xmlns:a16="http://schemas.microsoft.com/office/drawing/2014/main" id="{7A910DC3-5C76-4859-ACD6-197F0B757EF6}"/>
+                <a16:creationId xmlns:a16="http://schemas.microsoft.com/office/drawing/2014/main" xmlns="" id="{7A910DC3-5C76-4859-ACD6-197F0B757EF6}"/>
               </a:ext>
             </a:extLst>
           </p:cNvPr>
@@ -1002,7 +1029,7 @@
           <p:cNvPr id="3" name="Espaço Reservado para Texto 2">
             <a:extLst>
               <a:ext uri="{FF2B5EF4-FFF2-40B4-BE49-F238E27FC236}">
-                <a16:creationId xmlns="" xmlns:a16="http://schemas.microsoft.com/office/drawing/2014/main" id="{C0EDE091-B5CC-497E-9AAF-1735E3EC765D}"/>
+                <a16:creationId xmlns:a16="http://schemas.microsoft.com/office/drawing/2014/main" xmlns="" id="{C0EDE091-B5CC-497E-9AAF-1735E3EC765D}"/>
               </a:ext>
             </a:extLst>
           </p:cNvPr>
@@ -1127,7 +1154,7 @@
           <p:cNvPr id="4" name="Espaço Reservado para Data 3">
             <a:extLst>
               <a:ext uri="{FF2B5EF4-FFF2-40B4-BE49-F238E27FC236}">
-                <a16:creationId xmlns="" xmlns:a16="http://schemas.microsoft.com/office/drawing/2014/main" id="{C32CEFDD-F373-4DD3-A06D-14AA605D31E0}"/>
+                <a16:creationId xmlns:a16="http://schemas.microsoft.com/office/drawing/2014/main" xmlns="" id="{C32CEFDD-F373-4DD3-A06D-14AA605D31E0}"/>
               </a:ext>
             </a:extLst>
           </p:cNvPr>
@@ -1145,7 +1172,7 @@
           <a:p>
             <a:fld id="{8534D01F-854E-4A4D-8288-8E2FDA9CA879}" type="datetimeFigureOut">
               <a:rPr lang="pt-BR" smtClean="0"/>
-              <a:t>25/03/2021</a:t>
+              <a:t>27/05/2021</a:t>
             </a:fld>
             <a:endParaRPr lang="pt-BR"/>
           </a:p>
@@ -1156,7 +1183,7 @@
           <p:cNvPr id="5" name="Espaço Reservado para Rodapé 4">
             <a:extLst>
               <a:ext uri="{FF2B5EF4-FFF2-40B4-BE49-F238E27FC236}">
-                <a16:creationId xmlns="" xmlns:a16="http://schemas.microsoft.com/office/drawing/2014/main" id="{04AC8B46-AFA5-4F10-A687-20376D144E22}"/>
+                <a16:creationId xmlns:a16="http://schemas.microsoft.com/office/drawing/2014/main" xmlns="" id="{04AC8B46-AFA5-4F10-A687-20376D144E22}"/>
               </a:ext>
             </a:extLst>
           </p:cNvPr>
@@ -1181,7 +1208,7 @@
           <p:cNvPr id="6" name="Espaço Reservado para Número de Slide 5">
             <a:extLst>
               <a:ext uri="{FF2B5EF4-FFF2-40B4-BE49-F238E27FC236}">
-                <a16:creationId xmlns="" xmlns:a16="http://schemas.microsoft.com/office/drawing/2014/main" id="{172CB77E-2D05-4B26-9D60-33EDB1BC6A7D}"/>
+                <a16:creationId xmlns:a16="http://schemas.microsoft.com/office/drawing/2014/main" xmlns="" id="{172CB77E-2D05-4B26-9D60-33EDB1BC6A7D}"/>
               </a:ext>
             </a:extLst>
           </p:cNvPr>
@@ -1240,7 +1267,7 @@
           <p:cNvPr id="2" name="Título 1">
             <a:extLst>
               <a:ext uri="{FF2B5EF4-FFF2-40B4-BE49-F238E27FC236}">
-                <a16:creationId xmlns="" xmlns:a16="http://schemas.microsoft.com/office/drawing/2014/main" id="{52C772EB-678E-4414-AEBF-006B8CC66B0A}"/>
+                <a16:creationId xmlns:a16="http://schemas.microsoft.com/office/drawing/2014/main" xmlns="" id="{52C772EB-678E-4414-AEBF-006B8CC66B0A}"/>
               </a:ext>
             </a:extLst>
           </p:cNvPr>
@@ -1268,7 +1295,7 @@
           <p:cNvPr id="3" name="Espaço Reservado para Conteúdo 2">
             <a:extLst>
               <a:ext uri="{FF2B5EF4-FFF2-40B4-BE49-F238E27FC236}">
-                <a16:creationId xmlns="" xmlns:a16="http://schemas.microsoft.com/office/drawing/2014/main" id="{CE180650-AB60-4080-8F43-9ABAC0C6D23E}"/>
+                <a16:creationId xmlns:a16="http://schemas.microsoft.com/office/drawing/2014/main" xmlns="" id="{CE180650-AB60-4080-8F43-9ABAC0C6D23E}"/>
               </a:ext>
             </a:extLst>
           </p:cNvPr>
@@ -1330,7 +1357,7 @@
           <p:cNvPr id="4" name="Espaço Reservado para Conteúdo 3">
             <a:extLst>
               <a:ext uri="{FF2B5EF4-FFF2-40B4-BE49-F238E27FC236}">
-                <a16:creationId xmlns="" xmlns:a16="http://schemas.microsoft.com/office/drawing/2014/main" id="{2B921F60-8D07-4525-9190-AC8AC7A97A3E}"/>
+                <a16:creationId xmlns:a16="http://schemas.microsoft.com/office/drawing/2014/main" xmlns="" id="{2B921F60-8D07-4525-9190-AC8AC7A97A3E}"/>
               </a:ext>
             </a:extLst>
           </p:cNvPr>
@@ -1392,7 +1419,7 @@
           <p:cNvPr id="5" name="Espaço Reservado para Data 4">
             <a:extLst>
               <a:ext uri="{FF2B5EF4-FFF2-40B4-BE49-F238E27FC236}">
-                <a16:creationId xmlns="" xmlns:a16="http://schemas.microsoft.com/office/drawing/2014/main" id="{E51B3B1B-15DA-4267-ABC4-7E98722669ED}"/>
+                <a16:creationId xmlns:a16="http://schemas.microsoft.com/office/drawing/2014/main" xmlns="" id="{E51B3B1B-15DA-4267-ABC4-7E98722669ED}"/>
               </a:ext>
             </a:extLst>
           </p:cNvPr>
@@ -1410,7 +1437,7 @@
           <a:p>
             <a:fld id="{8534D01F-854E-4A4D-8288-8E2FDA9CA879}" type="datetimeFigureOut">
               <a:rPr lang="pt-BR" smtClean="0"/>
-              <a:t>25/03/2021</a:t>
+              <a:t>27/05/2021</a:t>
             </a:fld>
             <a:endParaRPr lang="pt-BR"/>
           </a:p>
@@ -1421,7 +1448,7 @@
           <p:cNvPr id="6" name="Espaço Reservado para Rodapé 5">
             <a:extLst>
               <a:ext uri="{FF2B5EF4-FFF2-40B4-BE49-F238E27FC236}">
-                <a16:creationId xmlns="" xmlns:a16="http://schemas.microsoft.com/office/drawing/2014/main" id="{FBE99837-B171-49B3-83E3-201DEC46BEAF}"/>
+                <a16:creationId xmlns:a16="http://schemas.microsoft.com/office/drawing/2014/main" xmlns="" id="{FBE99837-B171-49B3-83E3-201DEC46BEAF}"/>
               </a:ext>
             </a:extLst>
           </p:cNvPr>
@@ -1446,7 +1473,7 @@
           <p:cNvPr id="7" name="Espaço Reservado para Número de Slide 6">
             <a:extLst>
               <a:ext uri="{FF2B5EF4-FFF2-40B4-BE49-F238E27FC236}">
-                <a16:creationId xmlns="" xmlns:a16="http://schemas.microsoft.com/office/drawing/2014/main" id="{66FE9F44-5267-40D6-A45F-F2F1E69F1B6A}"/>
+                <a16:creationId xmlns:a16="http://schemas.microsoft.com/office/drawing/2014/main" xmlns="" id="{66FE9F44-5267-40D6-A45F-F2F1E69F1B6A}"/>
               </a:ext>
             </a:extLst>
           </p:cNvPr>
@@ -1505,7 +1532,7 @@
           <p:cNvPr id="2" name="Título 1">
             <a:extLst>
               <a:ext uri="{FF2B5EF4-FFF2-40B4-BE49-F238E27FC236}">
-                <a16:creationId xmlns="" xmlns:a16="http://schemas.microsoft.com/office/drawing/2014/main" id="{E29D1D98-13AC-4305-A635-9E6CB659D02E}"/>
+                <a16:creationId xmlns:a16="http://schemas.microsoft.com/office/drawing/2014/main" xmlns="" id="{E29D1D98-13AC-4305-A635-9E6CB659D02E}"/>
               </a:ext>
             </a:extLst>
           </p:cNvPr>
@@ -1538,7 +1565,7 @@
           <p:cNvPr id="3" name="Espaço Reservado para Texto 2">
             <a:extLst>
               <a:ext uri="{FF2B5EF4-FFF2-40B4-BE49-F238E27FC236}">
-                <a16:creationId xmlns="" xmlns:a16="http://schemas.microsoft.com/office/drawing/2014/main" id="{E84A6BA9-DEC6-4189-8E3A-8BDE62C7E162}"/>
+                <a16:creationId xmlns:a16="http://schemas.microsoft.com/office/drawing/2014/main" xmlns="" id="{E84A6BA9-DEC6-4189-8E3A-8BDE62C7E162}"/>
               </a:ext>
             </a:extLst>
           </p:cNvPr>
@@ -1609,7 +1636,7 @@
           <p:cNvPr id="4" name="Espaço Reservado para Conteúdo 3">
             <a:extLst>
               <a:ext uri="{FF2B5EF4-FFF2-40B4-BE49-F238E27FC236}">
-                <a16:creationId xmlns="" xmlns:a16="http://schemas.microsoft.com/office/drawing/2014/main" id="{676623F9-CFDD-435B-B978-F19D81E7298D}"/>
+                <a16:creationId xmlns:a16="http://schemas.microsoft.com/office/drawing/2014/main" xmlns="" id="{676623F9-CFDD-435B-B978-F19D81E7298D}"/>
               </a:ext>
             </a:extLst>
           </p:cNvPr>
@@ -1671,7 +1698,7 @@
           <p:cNvPr id="5" name="Espaço Reservado para Texto 4">
             <a:extLst>
               <a:ext uri="{FF2B5EF4-FFF2-40B4-BE49-F238E27FC236}">
-                <a16:creationId xmlns="" xmlns:a16="http://schemas.microsoft.com/office/drawing/2014/main" id="{4DF5096A-9E89-4439-853B-A24449B9172B}"/>
+                <a16:creationId xmlns:a16="http://schemas.microsoft.com/office/drawing/2014/main" xmlns="" id="{4DF5096A-9E89-4439-853B-A24449B9172B}"/>
               </a:ext>
             </a:extLst>
           </p:cNvPr>
@@ -1742,7 +1769,7 @@
           <p:cNvPr id="6" name="Espaço Reservado para Conteúdo 5">
             <a:extLst>
               <a:ext uri="{FF2B5EF4-FFF2-40B4-BE49-F238E27FC236}">
-                <a16:creationId xmlns="" xmlns:a16="http://schemas.microsoft.com/office/drawing/2014/main" id="{6F0B0FC2-9BE5-4C7B-8CDF-8F122C794811}"/>
+                <a16:creationId xmlns:a16="http://schemas.microsoft.com/office/drawing/2014/main" xmlns="" id="{6F0B0FC2-9BE5-4C7B-8CDF-8F122C794811}"/>
               </a:ext>
             </a:extLst>
           </p:cNvPr>
@@ -1804,7 +1831,7 @@
           <p:cNvPr id="7" name="Espaço Reservado para Data 6">
             <a:extLst>
               <a:ext uri="{FF2B5EF4-FFF2-40B4-BE49-F238E27FC236}">
-                <a16:creationId xmlns="" xmlns:a16="http://schemas.microsoft.com/office/drawing/2014/main" id="{D4E67033-E31F-4D18-A9A9-7B3418F166D2}"/>
+                <a16:creationId xmlns:a16="http://schemas.microsoft.com/office/drawing/2014/main" xmlns="" id="{D4E67033-E31F-4D18-A9A9-7B3418F166D2}"/>
               </a:ext>
             </a:extLst>
           </p:cNvPr>
@@ -1822,7 +1849,7 @@
           <a:p>
             <a:fld id="{8534D01F-854E-4A4D-8288-8E2FDA9CA879}" type="datetimeFigureOut">
               <a:rPr lang="pt-BR" smtClean="0"/>
-              <a:t>25/03/2021</a:t>
+              <a:t>27/05/2021</a:t>
             </a:fld>
             <a:endParaRPr lang="pt-BR"/>
           </a:p>
@@ -1833,7 +1860,7 @@
           <p:cNvPr id="8" name="Espaço Reservado para Rodapé 7">
             <a:extLst>
               <a:ext uri="{FF2B5EF4-FFF2-40B4-BE49-F238E27FC236}">
-                <a16:creationId xmlns="" xmlns:a16="http://schemas.microsoft.com/office/drawing/2014/main" id="{92FA8276-4F45-4E3F-8406-DE6E1F2A4833}"/>
+                <a16:creationId xmlns:a16="http://schemas.microsoft.com/office/drawing/2014/main" xmlns="" id="{92FA8276-4F45-4E3F-8406-DE6E1F2A4833}"/>
               </a:ext>
             </a:extLst>
           </p:cNvPr>
@@ -1858,7 +1885,7 @@
           <p:cNvPr id="9" name="Espaço Reservado para Número de Slide 8">
             <a:extLst>
               <a:ext uri="{FF2B5EF4-FFF2-40B4-BE49-F238E27FC236}">
-                <a16:creationId xmlns="" xmlns:a16="http://schemas.microsoft.com/office/drawing/2014/main" id="{CB582973-A471-44DF-8A23-74EB6925ACF2}"/>
+                <a16:creationId xmlns:a16="http://schemas.microsoft.com/office/drawing/2014/main" xmlns="" id="{CB582973-A471-44DF-8A23-74EB6925ACF2}"/>
               </a:ext>
             </a:extLst>
           </p:cNvPr>
@@ -1917,7 +1944,7 @@
           <p:cNvPr id="2" name="Título 1">
             <a:extLst>
               <a:ext uri="{FF2B5EF4-FFF2-40B4-BE49-F238E27FC236}">
-                <a16:creationId xmlns="" xmlns:a16="http://schemas.microsoft.com/office/drawing/2014/main" id="{00A9DB8E-D9BE-4265-813A-741B01931C7F}"/>
+                <a16:creationId xmlns:a16="http://schemas.microsoft.com/office/drawing/2014/main" xmlns="" id="{00A9DB8E-D9BE-4265-813A-741B01931C7F}"/>
               </a:ext>
             </a:extLst>
           </p:cNvPr>
@@ -1945,7 +1972,7 @@
           <p:cNvPr id="3" name="Espaço Reservado para Data 2">
             <a:extLst>
               <a:ext uri="{FF2B5EF4-FFF2-40B4-BE49-F238E27FC236}">
-                <a16:creationId xmlns="" xmlns:a16="http://schemas.microsoft.com/office/drawing/2014/main" id="{8DBDC4FF-D509-4881-8879-C49545A9C339}"/>
+                <a16:creationId xmlns:a16="http://schemas.microsoft.com/office/drawing/2014/main" xmlns="" id="{8DBDC4FF-D509-4881-8879-C49545A9C339}"/>
               </a:ext>
             </a:extLst>
           </p:cNvPr>
@@ -1963,7 +1990,7 @@
           <a:p>
             <a:fld id="{8534D01F-854E-4A4D-8288-8E2FDA9CA879}" type="datetimeFigureOut">
               <a:rPr lang="pt-BR" smtClean="0"/>
-              <a:t>25/03/2021</a:t>
+              <a:t>27/05/2021</a:t>
             </a:fld>
             <a:endParaRPr lang="pt-BR"/>
           </a:p>
@@ -1974,7 +2001,7 @@
           <p:cNvPr id="4" name="Espaço Reservado para Rodapé 3">
             <a:extLst>
               <a:ext uri="{FF2B5EF4-FFF2-40B4-BE49-F238E27FC236}">
-                <a16:creationId xmlns="" xmlns:a16="http://schemas.microsoft.com/office/drawing/2014/main" id="{FF922AE6-F48D-473C-89D4-8288281125F1}"/>
+                <a16:creationId xmlns:a16="http://schemas.microsoft.com/office/drawing/2014/main" xmlns="" id="{FF922AE6-F48D-473C-89D4-8288281125F1}"/>
               </a:ext>
             </a:extLst>
           </p:cNvPr>
@@ -1999,7 +2026,7 @@
           <p:cNvPr id="5" name="Espaço Reservado para Número de Slide 4">
             <a:extLst>
               <a:ext uri="{FF2B5EF4-FFF2-40B4-BE49-F238E27FC236}">
-                <a16:creationId xmlns="" xmlns:a16="http://schemas.microsoft.com/office/drawing/2014/main" id="{ACC35C3F-7A41-4E38-8C60-32D203ED4C19}"/>
+                <a16:creationId xmlns:a16="http://schemas.microsoft.com/office/drawing/2014/main" xmlns="" id="{ACC35C3F-7A41-4E38-8C60-32D203ED4C19}"/>
               </a:ext>
             </a:extLst>
           </p:cNvPr>
@@ -2058,7 +2085,7 @@
           <p:cNvPr id="2" name="Espaço Reservado para Data 1">
             <a:extLst>
               <a:ext uri="{FF2B5EF4-FFF2-40B4-BE49-F238E27FC236}">
-                <a16:creationId xmlns="" xmlns:a16="http://schemas.microsoft.com/office/drawing/2014/main" id="{107CE84F-5B14-42A1-843C-B2BAA4699A52}"/>
+                <a16:creationId xmlns:a16="http://schemas.microsoft.com/office/drawing/2014/main" xmlns="" id="{107CE84F-5B14-42A1-843C-B2BAA4699A52}"/>
               </a:ext>
             </a:extLst>
           </p:cNvPr>
@@ -2076,7 +2103,7 @@
           <a:p>
             <a:fld id="{8534D01F-854E-4A4D-8288-8E2FDA9CA879}" type="datetimeFigureOut">
               <a:rPr lang="pt-BR" smtClean="0"/>
-              <a:t>25/03/2021</a:t>
+              <a:t>27/05/2021</a:t>
             </a:fld>
             <a:endParaRPr lang="pt-BR"/>
           </a:p>
@@ -2087,7 +2114,7 @@
           <p:cNvPr id="3" name="Espaço Reservado para Rodapé 2">
             <a:extLst>
               <a:ext uri="{FF2B5EF4-FFF2-40B4-BE49-F238E27FC236}">
-                <a16:creationId xmlns="" xmlns:a16="http://schemas.microsoft.com/office/drawing/2014/main" id="{534278BE-13A7-417D-87DA-D4A43B383378}"/>
+                <a16:creationId xmlns:a16="http://schemas.microsoft.com/office/drawing/2014/main" xmlns="" id="{534278BE-13A7-417D-87DA-D4A43B383378}"/>
               </a:ext>
             </a:extLst>
           </p:cNvPr>
@@ -2112,7 +2139,7 @@
           <p:cNvPr id="4" name="Espaço Reservado para Número de Slide 3">
             <a:extLst>
               <a:ext uri="{FF2B5EF4-FFF2-40B4-BE49-F238E27FC236}">
-                <a16:creationId xmlns="" xmlns:a16="http://schemas.microsoft.com/office/drawing/2014/main" id="{5813BA74-C974-4513-8184-F21277BD306C}"/>
+                <a16:creationId xmlns:a16="http://schemas.microsoft.com/office/drawing/2014/main" xmlns="" id="{5813BA74-C974-4513-8184-F21277BD306C}"/>
               </a:ext>
             </a:extLst>
           </p:cNvPr>
@@ -2171,7 +2198,7 @@
           <p:cNvPr id="2" name="Título 1">
             <a:extLst>
               <a:ext uri="{FF2B5EF4-FFF2-40B4-BE49-F238E27FC236}">
-                <a16:creationId xmlns="" xmlns:a16="http://schemas.microsoft.com/office/drawing/2014/main" id="{1A7816C9-B3F4-4B78-BDCE-B14BE1CEE866}"/>
+                <a16:creationId xmlns:a16="http://schemas.microsoft.com/office/drawing/2014/main" xmlns="" id="{1A7816C9-B3F4-4B78-BDCE-B14BE1CEE866}"/>
               </a:ext>
             </a:extLst>
           </p:cNvPr>
@@ -2208,7 +2235,7 @@
           <p:cNvPr id="3" name="Espaço Reservado para Conteúdo 2">
             <a:extLst>
               <a:ext uri="{FF2B5EF4-FFF2-40B4-BE49-F238E27FC236}">
-                <a16:creationId xmlns="" xmlns:a16="http://schemas.microsoft.com/office/drawing/2014/main" id="{0D764E09-D312-4B6A-AB35-1BAB25B7BDF4}"/>
+                <a16:creationId xmlns:a16="http://schemas.microsoft.com/office/drawing/2014/main" xmlns="" id="{0D764E09-D312-4B6A-AB35-1BAB25B7BDF4}"/>
               </a:ext>
             </a:extLst>
           </p:cNvPr>
@@ -2298,7 +2325,7 @@
           <p:cNvPr id="4" name="Espaço Reservado para Texto 3">
             <a:extLst>
               <a:ext uri="{FF2B5EF4-FFF2-40B4-BE49-F238E27FC236}">
-                <a16:creationId xmlns="" xmlns:a16="http://schemas.microsoft.com/office/drawing/2014/main" id="{D2D2E4B2-3638-43A2-B3EA-4B43D3128C17}"/>
+                <a16:creationId xmlns:a16="http://schemas.microsoft.com/office/drawing/2014/main" xmlns="" id="{D2D2E4B2-3638-43A2-B3EA-4B43D3128C17}"/>
               </a:ext>
             </a:extLst>
           </p:cNvPr>
@@ -2369,7 +2396,7 @@
           <p:cNvPr id="5" name="Espaço Reservado para Data 4">
             <a:extLst>
               <a:ext uri="{FF2B5EF4-FFF2-40B4-BE49-F238E27FC236}">
-                <a16:creationId xmlns="" xmlns:a16="http://schemas.microsoft.com/office/drawing/2014/main" id="{D90789D6-1DA6-4956-94ED-48FEC2D5CCCC}"/>
+                <a16:creationId xmlns:a16="http://schemas.microsoft.com/office/drawing/2014/main" xmlns="" id="{D90789D6-1DA6-4956-94ED-48FEC2D5CCCC}"/>
               </a:ext>
             </a:extLst>
           </p:cNvPr>
@@ -2387,7 +2414,7 @@
           <a:p>
             <a:fld id="{8534D01F-854E-4A4D-8288-8E2FDA9CA879}" type="datetimeFigureOut">
               <a:rPr lang="pt-BR" smtClean="0"/>
-              <a:t>25/03/2021</a:t>
+              <a:t>27/05/2021</a:t>
             </a:fld>
             <a:endParaRPr lang="pt-BR"/>
           </a:p>
@@ -2398,7 +2425,7 @@
           <p:cNvPr id="6" name="Espaço Reservado para Rodapé 5">
             <a:extLst>
               <a:ext uri="{FF2B5EF4-FFF2-40B4-BE49-F238E27FC236}">
-                <a16:creationId xmlns="" xmlns:a16="http://schemas.microsoft.com/office/drawing/2014/main" id="{7CA83338-C957-4269-A6A8-10EA9F58D868}"/>
+                <a16:creationId xmlns:a16="http://schemas.microsoft.com/office/drawing/2014/main" xmlns="" id="{7CA83338-C957-4269-A6A8-10EA9F58D868}"/>
               </a:ext>
             </a:extLst>
           </p:cNvPr>
@@ -2423,7 +2450,7 @@
           <p:cNvPr id="7" name="Espaço Reservado para Número de Slide 6">
             <a:extLst>
               <a:ext uri="{FF2B5EF4-FFF2-40B4-BE49-F238E27FC236}">
-                <a16:creationId xmlns="" xmlns:a16="http://schemas.microsoft.com/office/drawing/2014/main" id="{D18A79DB-D483-4F3F-8EFF-AD61E616D7B0}"/>
+                <a16:creationId xmlns:a16="http://schemas.microsoft.com/office/drawing/2014/main" xmlns="" id="{D18A79DB-D483-4F3F-8EFF-AD61E616D7B0}"/>
               </a:ext>
             </a:extLst>
           </p:cNvPr>
@@ -2482,7 +2509,7 @@
           <p:cNvPr id="2" name="Título 1">
             <a:extLst>
               <a:ext uri="{FF2B5EF4-FFF2-40B4-BE49-F238E27FC236}">
-                <a16:creationId xmlns="" xmlns:a16="http://schemas.microsoft.com/office/drawing/2014/main" id="{461C3CA1-3DB8-44DF-8069-D85BB32ED87D}"/>
+                <a16:creationId xmlns:a16="http://schemas.microsoft.com/office/drawing/2014/main" xmlns="" id="{461C3CA1-3DB8-44DF-8069-D85BB32ED87D}"/>
               </a:ext>
             </a:extLst>
           </p:cNvPr>
@@ -2519,7 +2546,7 @@
           <p:cNvPr id="3" name="Espaço Reservado para Imagem 2">
             <a:extLst>
               <a:ext uri="{FF2B5EF4-FFF2-40B4-BE49-F238E27FC236}">
-                <a16:creationId xmlns="" xmlns:a16="http://schemas.microsoft.com/office/drawing/2014/main" id="{A915D3C7-32AE-431A-B4BD-1E7B4A977FC8}"/>
+                <a16:creationId xmlns:a16="http://schemas.microsoft.com/office/drawing/2014/main" xmlns="" id="{A915D3C7-32AE-431A-B4BD-1E7B4A977FC8}"/>
               </a:ext>
             </a:extLst>
           </p:cNvPr>
@@ -2586,7 +2613,7 @@
           <p:cNvPr id="4" name="Espaço Reservado para Texto 3">
             <a:extLst>
               <a:ext uri="{FF2B5EF4-FFF2-40B4-BE49-F238E27FC236}">
-                <a16:creationId xmlns="" xmlns:a16="http://schemas.microsoft.com/office/drawing/2014/main" id="{681E2844-AA4E-4319-B49B-92A14D8E219E}"/>
+                <a16:creationId xmlns:a16="http://schemas.microsoft.com/office/drawing/2014/main" xmlns="" id="{681E2844-AA4E-4319-B49B-92A14D8E219E}"/>
               </a:ext>
             </a:extLst>
           </p:cNvPr>
@@ -2657,7 +2684,7 @@
           <p:cNvPr id="5" name="Espaço Reservado para Data 4">
             <a:extLst>
               <a:ext uri="{FF2B5EF4-FFF2-40B4-BE49-F238E27FC236}">
-                <a16:creationId xmlns="" xmlns:a16="http://schemas.microsoft.com/office/drawing/2014/main" id="{C79FE760-F4C9-40B9-BBE8-A171E86D7E93}"/>
+                <a16:creationId xmlns:a16="http://schemas.microsoft.com/office/drawing/2014/main" xmlns="" id="{C79FE760-F4C9-40B9-BBE8-A171E86D7E93}"/>
               </a:ext>
             </a:extLst>
           </p:cNvPr>
@@ -2675,7 +2702,7 @@
           <a:p>
             <a:fld id="{8534D01F-854E-4A4D-8288-8E2FDA9CA879}" type="datetimeFigureOut">
               <a:rPr lang="pt-BR" smtClean="0"/>
-              <a:t>25/03/2021</a:t>
+              <a:t>27/05/2021</a:t>
             </a:fld>
             <a:endParaRPr lang="pt-BR"/>
           </a:p>
@@ -2686,7 +2713,7 @@
           <p:cNvPr id="6" name="Espaço Reservado para Rodapé 5">
             <a:extLst>
               <a:ext uri="{FF2B5EF4-FFF2-40B4-BE49-F238E27FC236}">
-                <a16:creationId xmlns="" xmlns:a16="http://schemas.microsoft.com/office/drawing/2014/main" id="{C32DC4CF-01A3-4622-9865-2481B24F63A7}"/>
+                <a16:creationId xmlns:a16="http://schemas.microsoft.com/office/drawing/2014/main" xmlns="" id="{C32DC4CF-01A3-4622-9865-2481B24F63A7}"/>
               </a:ext>
             </a:extLst>
           </p:cNvPr>
@@ -2711,7 +2738,7 @@
           <p:cNvPr id="7" name="Espaço Reservado para Número de Slide 6">
             <a:extLst>
               <a:ext uri="{FF2B5EF4-FFF2-40B4-BE49-F238E27FC236}">
-                <a16:creationId xmlns="" xmlns:a16="http://schemas.microsoft.com/office/drawing/2014/main" id="{BF5B64E1-A636-40B3-A54F-00D1FC2B7196}"/>
+                <a16:creationId xmlns:a16="http://schemas.microsoft.com/office/drawing/2014/main" xmlns="" id="{BF5B64E1-A636-40B3-A54F-00D1FC2B7196}"/>
               </a:ext>
             </a:extLst>
           </p:cNvPr>
@@ -2775,7 +2802,7 @@
           <p:cNvPr id="2" name="Espaço Reservado para Título 1">
             <a:extLst>
               <a:ext uri="{FF2B5EF4-FFF2-40B4-BE49-F238E27FC236}">
-                <a16:creationId xmlns="" xmlns:a16="http://schemas.microsoft.com/office/drawing/2014/main" id="{9B3FE8E6-0950-4887-A7D1-C3F6D6BE4186}"/>
+                <a16:creationId xmlns:a16="http://schemas.microsoft.com/office/drawing/2014/main" xmlns="" id="{9B3FE8E6-0950-4887-A7D1-C3F6D6BE4186}"/>
               </a:ext>
             </a:extLst>
           </p:cNvPr>
@@ -2813,7 +2840,7 @@
           <p:cNvPr id="3" name="Espaço Reservado para Texto 2">
             <a:extLst>
               <a:ext uri="{FF2B5EF4-FFF2-40B4-BE49-F238E27FC236}">
-                <a16:creationId xmlns="" xmlns:a16="http://schemas.microsoft.com/office/drawing/2014/main" id="{97354259-5950-4AF1-A86B-383087B1AEA6}"/>
+                <a16:creationId xmlns:a16="http://schemas.microsoft.com/office/drawing/2014/main" xmlns="" id="{97354259-5950-4AF1-A86B-383087B1AEA6}"/>
               </a:ext>
             </a:extLst>
           </p:cNvPr>
@@ -2880,7 +2907,7 @@
           <p:cNvPr id="4" name="Espaço Reservado para Data 3">
             <a:extLst>
               <a:ext uri="{FF2B5EF4-FFF2-40B4-BE49-F238E27FC236}">
-                <a16:creationId xmlns="" xmlns:a16="http://schemas.microsoft.com/office/drawing/2014/main" id="{5B4313B2-886A-4A94-9E37-4E9E2837A59D}"/>
+                <a16:creationId xmlns:a16="http://schemas.microsoft.com/office/drawing/2014/main" xmlns="" id="{5B4313B2-886A-4A94-9E37-4E9E2837A59D}"/>
               </a:ext>
             </a:extLst>
           </p:cNvPr>
@@ -2916,7 +2943,7 @@
           <a:p>
             <a:fld id="{8534D01F-854E-4A4D-8288-8E2FDA9CA879}" type="datetimeFigureOut">
               <a:rPr lang="pt-BR" smtClean="0"/>
-              <a:t>25/03/2021</a:t>
+              <a:t>27/05/2021</a:t>
             </a:fld>
             <a:endParaRPr lang="pt-BR"/>
           </a:p>
@@ -2927,7 +2954,7 @@
           <p:cNvPr id="5" name="Espaço Reservado para Rodapé 4">
             <a:extLst>
               <a:ext uri="{FF2B5EF4-FFF2-40B4-BE49-F238E27FC236}">
-                <a16:creationId xmlns="" xmlns:a16="http://schemas.microsoft.com/office/drawing/2014/main" id="{2014752A-1EC6-4D35-A6D5-C8A1D93CA151}"/>
+                <a16:creationId xmlns:a16="http://schemas.microsoft.com/office/drawing/2014/main" xmlns="" id="{2014752A-1EC6-4D35-A6D5-C8A1D93CA151}"/>
               </a:ext>
             </a:extLst>
           </p:cNvPr>
@@ -2970,7 +2997,7 @@
           <p:cNvPr id="6" name="Espaço Reservado para Número de Slide 5">
             <a:extLst>
               <a:ext uri="{FF2B5EF4-FFF2-40B4-BE49-F238E27FC236}">
-                <a16:creationId xmlns="" xmlns:a16="http://schemas.microsoft.com/office/drawing/2014/main" id="{130A781C-309F-429C-A85B-26BD384AE317}"/>
+                <a16:creationId xmlns:a16="http://schemas.microsoft.com/office/drawing/2014/main" xmlns="" id="{130A781C-309F-429C-A85B-26BD384AE317}"/>
               </a:ext>
             </a:extLst>
           </p:cNvPr>
@@ -3338,7 +3365,7 @@
           <p:cNvPr id="2" name="Título 1">
             <a:extLst>
               <a:ext uri="{FF2B5EF4-FFF2-40B4-BE49-F238E27FC236}">
-                <a16:creationId xmlns="" xmlns:a16="http://schemas.microsoft.com/office/drawing/2014/main" id="{C1376B10-3F3E-4841-96FF-04A226002366}"/>
+                <a16:creationId xmlns:a16="http://schemas.microsoft.com/office/drawing/2014/main" xmlns="" id="{C1376B10-3F3E-4841-96FF-04A226002366}"/>
               </a:ext>
             </a:extLst>
           </p:cNvPr>
@@ -3371,7 +3398,7 @@
           <p:cNvPr id="3" name="Subtítulo 2">
             <a:extLst>
               <a:ext uri="{FF2B5EF4-FFF2-40B4-BE49-F238E27FC236}">
-                <a16:creationId xmlns="" xmlns:a16="http://schemas.microsoft.com/office/drawing/2014/main" id="{73859615-9F56-4097-AF1E-ECE6826AAC75}"/>
+                <a16:creationId xmlns:a16="http://schemas.microsoft.com/office/drawing/2014/main" xmlns="" id="{73859615-9F56-4097-AF1E-ECE6826AAC75}"/>
               </a:ext>
             </a:extLst>
           </p:cNvPr>
@@ -3426,32 +3453,10 @@
                   </a:schemeClr>
                 </a:solidFill>
               </a:rPr>
-              <a:t>Enricky Oliveira Nascimento - </a:t>
-            </a:r>
-            <a:r>
-              <a:rPr lang="pt-BR" dirty="0" smtClean="0">
-                <a:solidFill>
-                  <a:schemeClr val="tx1">
-                    <a:lumMod val="65000"/>
-                    <a:lumOff val="35000"/>
-                  </a:schemeClr>
-                </a:solidFill>
-              </a:rPr>
-              <a:t>1902858</a:t>
-            </a:r>
-          </a:p>
-          <a:p>
-            <a:r>
-              <a:rPr lang="pt-BR" dirty="0" smtClean="0">
-                <a:solidFill>
-                  <a:schemeClr val="tx1">
-                    <a:lumMod val="65000"/>
-                    <a:lumOff val="35000"/>
-                  </a:schemeClr>
-                </a:solidFill>
-              </a:rPr>
-              <a:t>João </a:t>
-            </a:r>
+              <a:t>Enricky Oliveira Nascimento - 1902858</a:t>
+            </a:r>
+          </a:p>
+          <a:p>
             <a:r>
               <a:rPr lang="pt-BR" dirty="0">
                 <a:solidFill>
@@ -3461,7 +3466,7 @@
                   </a:schemeClr>
                 </a:solidFill>
               </a:rPr>
-              <a:t>Camargo - 1903878</a:t>
+              <a:t>João Camargo - 1903878</a:t>
             </a:r>
           </a:p>
           <a:p>
@@ -3474,18 +3479,7 @@
                   </a:schemeClr>
                 </a:solidFill>
               </a:rPr>
-              <a:t>Renan Almeida </a:t>
-            </a:r>
-            <a:r>
-              <a:rPr lang="pt-BR" dirty="0" smtClean="0">
-                <a:solidFill>
-                  <a:schemeClr val="tx1">
-                    <a:lumMod val="65000"/>
-                    <a:lumOff val="35000"/>
-                  </a:schemeClr>
-                </a:solidFill>
-              </a:rPr>
-              <a:t>– 1902681</a:t>
+              <a:t>Renan Almeida – 1902681</a:t>
             </a:r>
           </a:p>
           <a:p>
@@ -3503,17 +3497,6 @@
           </a:p>
           <a:p>
             <a:r>
-              <a:rPr lang="pt-BR" dirty="0" smtClean="0">
-                <a:solidFill>
-                  <a:schemeClr val="tx1">
-                    <a:lumMod val="65000"/>
-                    <a:lumOff val="35000"/>
-                  </a:schemeClr>
-                </a:solidFill>
-              </a:rPr>
-              <a:t>Vinícius </a:t>
-            </a:r>
-            <a:r>
               <a:rPr lang="pt-BR" dirty="0">
                 <a:solidFill>
                   <a:schemeClr val="tx1">
@@ -3522,18 +3505,7 @@
                   </a:schemeClr>
                 </a:solidFill>
               </a:rPr>
-              <a:t>de Andrade Fernandes </a:t>
-            </a:r>
-            <a:r>
-              <a:rPr lang="pt-BR" dirty="0" smtClean="0">
-                <a:solidFill>
-                  <a:schemeClr val="tx1">
-                    <a:lumMod val="65000"/>
-                    <a:lumOff val="35000"/>
-                  </a:schemeClr>
-                </a:solidFill>
-              </a:rPr>
-              <a:t>– 1902740</a:t>
+              <a:t>Vinícius de Andrade Fernandes – 1902740</a:t>
             </a:r>
           </a:p>
           <a:p>
@@ -3546,27 +3518,8 @@
                   </a:schemeClr>
                 </a:solidFill>
               </a:rPr>
-              <a:t>Wagner Gonçalves – </a:t>
-            </a:r>
-            <a:r>
-              <a:rPr lang="pt-BR" dirty="0" smtClean="0">
-                <a:solidFill>
-                  <a:schemeClr val="tx1">
-                    <a:lumMod val="65000"/>
-                    <a:lumOff val="35000"/>
-                  </a:schemeClr>
-                </a:solidFill>
-              </a:rPr>
-              <a:t>1904182</a:t>
-            </a:r>
-            <a:endParaRPr lang="pt-BR" dirty="0">
-              <a:solidFill>
-                <a:schemeClr val="tx1">
-                  <a:lumMod val="65000"/>
-                  <a:lumOff val="35000"/>
-                </a:schemeClr>
-              </a:solidFill>
-            </a:endParaRPr>
+              <a:t>Wagner Gonçalves – 1904182</a:t>
+            </a:r>
           </a:p>
         </p:txBody>
       </p:sp>
@@ -3605,7 +3558,7 @@
           <p:cNvPr id="2" name="CaixaDeTexto 1">
             <a:extLst>
               <a:ext uri="{FF2B5EF4-FFF2-40B4-BE49-F238E27FC236}">
-                <a16:creationId xmlns="" xmlns:a16="http://schemas.microsoft.com/office/drawing/2014/main" id="{0CFF9A50-611F-4F60-BD80-2743B7BDF35A}"/>
+                <a16:creationId xmlns:a16="http://schemas.microsoft.com/office/drawing/2014/main" xmlns="" id="{0CFF9A50-611F-4F60-BD80-2743B7BDF35A}"/>
               </a:ext>
             </a:extLst>
           </p:cNvPr>
@@ -3630,10 +3583,10 @@
           <a:p>
             <a:pPr algn="ctr"/>
             <a:r>
-              <a:rPr lang="pt-BR" sz="2800" b="1" dirty="0" err="1" smtClean="0"/>
+              <a:rPr lang="pt-BR" sz="2800" b="1" dirty="0" err="1"/>
               <a:t>HairTech</a:t>
             </a:r>
-            <a:endParaRPr lang="pt-BR" sz="2800" b="1" dirty="0" smtClean="0"/>
+            <a:endParaRPr lang="pt-BR" sz="2800" b="1" dirty="0"/>
           </a:p>
           <a:p>
             <a:pPr marL="285750" indent="-285750">
@@ -3641,7 +3594,7 @@
               <a:buChar char="•"/>
             </a:pPr>
             <a:r>
-              <a:rPr lang="pt-BR" sz="2400" dirty="0" smtClean="0"/>
+              <a:rPr lang="pt-BR" sz="2400" dirty="0"/>
               <a:t>O Cliente pode fazer um agendamento por telefone de algum serviço.</a:t>
             </a:r>
           </a:p>
@@ -3651,12 +3604,8 @@
               <a:buChar char="•"/>
             </a:pPr>
             <a:r>
-              <a:rPr lang="pt-BR" sz="2400" dirty="0" smtClean="0"/>
-              <a:t>Caso </a:t>
-            </a:r>
-            <a:r>
               <a:rPr lang="pt-BR" sz="2400" dirty="0"/>
-              <a:t>o cliente não tenha hora marcada ao entrar no estabelecimento, poderá escolher um assento livre e esperar até o atendimento.</a:t>
+              <a:t>Caso o cliente não tenha hora marcada ao entrar no estabelecimento, poderá escolher um assento livre e esperar até o atendimento.</a:t>
             </a:r>
           </a:p>
           <a:p>
@@ -3666,15 +3615,7 @@
             </a:pPr>
             <a:r>
               <a:rPr lang="pt-BR" sz="2400" dirty="0"/>
-              <a:t>Após o serviço escolhido ser concluído, ele recebe a comanda do prestador de </a:t>
-            </a:r>
-            <a:r>
-              <a:rPr lang="pt-BR" sz="2400" dirty="0" smtClean="0"/>
-              <a:t>serviço (</a:t>
-            </a:r>
-            <a:r>
-              <a:rPr lang="pt-BR" sz="2400" dirty="0"/>
-              <a:t>cabelereiro, manicure ou depiladora).</a:t>
+              <a:t>Após o serviço escolhido ser concluído, ele recebe a comanda do prestador de serviço (cabelereiro, manicure ou depiladora).</a:t>
             </a:r>
           </a:p>
           <a:p>
@@ -3684,23 +3625,7 @@
             </a:pPr>
             <a:r>
               <a:rPr lang="pt-BR" sz="2400" dirty="0"/>
-              <a:t>É efetuado o pagamento </a:t>
-            </a:r>
-            <a:r>
-              <a:rPr lang="pt-BR" sz="2400" dirty="0" smtClean="0"/>
-              <a:t>e a segunda via do mesmo é guardada para posteriormente ser contabilizada </a:t>
-            </a:r>
-            <a:r>
-              <a:rPr lang="pt-BR" sz="2400" dirty="0"/>
-              <a:t>no final </a:t>
-            </a:r>
-            <a:r>
-              <a:rPr lang="pt-BR" sz="2400" dirty="0" smtClean="0"/>
-              <a:t>de cada </a:t>
-            </a:r>
-            <a:r>
-              <a:rPr lang="pt-BR" sz="2400" dirty="0"/>
-              <a:t>semana.</a:t>
+              <a:t>É efetuado o pagamento e a segunda via do mesmo é guardada para posteriormente ser contabilizada no final de cada semana.</a:t>
             </a:r>
           </a:p>
           <a:p>
@@ -3754,7 +3679,7 @@
           <p:cNvPr id="2" name="Título 1">
             <a:extLst>
               <a:ext uri="{FF2B5EF4-FFF2-40B4-BE49-F238E27FC236}">
-                <a16:creationId xmlns="" xmlns:a16="http://schemas.microsoft.com/office/drawing/2014/main" id="{BAC0FD8D-E2A9-409B-9650-6EE5E2F76F26}"/>
+                <a16:creationId xmlns:a16="http://schemas.microsoft.com/office/drawing/2014/main" xmlns="" id="{BAC0FD8D-E2A9-409B-9650-6EE5E2F76F26}"/>
               </a:ext>
             </a:extLst>
           </p:cNvPr>
@@ -3791,7 +3716,7 @@
           <p:cNvPr id="5" name="Retângulo: Cantos Arredondados 4">
             <a:extLst>
               <a:ext uri="{FF2B5EF4-FFF2-40B4-BE49-F238E27FC236}">
-                <a16:creationId xmlns="" xmlns:a16="http://schemas.microsoft.com/office/drawing/2014/main" id="{A9C1CD43-0FB8-4D9D-A57C-74E863C28146}"/>
+                <a16:creationId xmlns:a16="http://schemas.microsoft.com/office/drawing/2014/main" xmlns="" id="{A9C1CD43-0FB8-4D9D-A57C-74E863C28146}"/>
               </a:ext>
             </a:extLst>
           </p:cNvPr>
@@ -3854,7 +3779,7 @@
           <p:cNvPr id="6" name="CaixaDeTexto 5">
             <a:extLst>
               <a:ext uri="{FF2B5EF4-FFF2-40B4-BE49-F238E27FC236}">
-                <a16:creationId xmlns="" xmlns:a16="http://schemas.microsoft.com/office/drawing/2014/main" id="{2D7CE326-F24F-4DD8-9F6B-CBA66F2EB184}"/>
+                <a16:creationId xmlns:a16="http://schemas.microsoft.com/office/drawing/2014/main" xmlns="" id="{2D7CE326-F24F-4DD8-9F6B-CBA66F2EB184}"/>
               </a:ext>
             </a:extLst>
           </p:cNvPr>
@@ -3895,7 +3820,7 @@
           <p:cNvPr id="4" name="Retângulo 3">
             <a:extLst>
               <a:ext uri="{FF2B5EF4-FFF2-40B4-BE49-F238E27FC236}">
-                <a16:creationId xmlns="" xmlns:a16="http://schemas.microsoft.com/office/drawing/2014/main" id="{6148B80D-94EB-4BB4-ADD8-2729C8C1D8A7}"/>
+                <a16:creationId xmlns:a16="http://schemas.microsoft.com/office/drawing/2014/main" xmlns="" id="{6148B80D-94EB-4BB4-ADD8-2729C8C1D8A7}"/>
               </a:ext>
             </a:extLst>
           </p:cNvPr>
@@ -3951,7 +3876,7 @@
           <p:cNvPr id="9" name="CaixaDeTexto 8">
             <a:extLst>
               <a:ext uri="{FF2B5EF4-FFF2-40B4-BE49-F238E27FC236}">
-                <a16:creationId xmlns="" xmlns:a16="http://schemas.microsoft.com/office/drawing/2014/main" id="{49353DD0-8323-48AF-9FBB-2D99D9ECEA22}"/>
+                <a16:creationId xmlns:a16="http://schemas.microsoft.com/office/drawing/2014/main" xmlns="" id="{49353DD0-8323-48AF-9FBB-2D99D9ECEA22}"/>
               </a:ext>
             </a:extLst>
           </p:cNvPr>
@@ -3975,10 +3900,9 @@
           <a:lstStyle/>
           <a:p>
             <a:r>
-              <a:rPr lang="pt-BR" sz="1600" dirty="0" smtClean="0"/>
+              <a:rPr lang="pt-BR" sz="1600" dirty="0"/>
               <a:t>1. Obter agendamento</a:t>
             </a:r>
-            <a:endParaRPr lang="pt-BR" sz="1600" dirty="0"/>
           </a:p>
         </p:txBody>
       </p:sp>
@@ -3987,7 +3911,7 @@
           <p:cNvPr id="10" name="Retângulo 9">
             <a:extLst>
               <a:ext uri="{FF2B5EF4-FFF2-40B4-BE49-F238E27FC236}">
-                <a16:creationId xmlns="" xmlns:a16="http://schemas.microsoft.com/office/drawing/2014/main" id="{6148B80D-94EB-4BB4-ADD8-2729C8C1D8A7}"/>
+                <a16:creationId xmlns:a16="http://schemas.microsoft.com/office/drawing/2014/main" xmlns="" id="{6148B80D-94EB-4BB4-ADD8-2729C8C1D8A7}"/>
               </a:ext>
             </a:extLst>
           </p:cNvPr>
@@ -4023,7 +3947,7 @@
           <a:p>
             <a:pPr algn="ctr"/>
             <a:r>
-              <a:rPr lang="pt-BR" sz="2800" b="1" dirty="0" smtClean="0">
+              <a:rPr lang="pt-BR" sz="2800" b="1" dirty="0">
                 <a:solidFill>
                   <a:schemeClr val="bg1"/>
                 </a:solidFill>
@@ -4074,7 +3998,7 @@
           <p:cNvPr id="13" name="CaixaDeTexto 12">
             <a:extLst>
               <a:ext uri="{FF2B5EF4-FFF2-40B4-BE49-F238E27FC236}">
-                <a16:creationId xmlns="" xmlns:a16="http://schemas.microsoft.com/office/drawing/2014/main" id="{49353DD0-8323-48AF-9FBB-2D99D9ECEA22}"/>
+                <a16:creationId xmlns:a16="http://schemas.microsoft.com/office/drawing/2014/main" xmlns="" id="{49353DD0-8323-48AF-9FBB-2D99D9ECEA22}"/>
               </a:ext>
             </a:extLst>
           </p:cNvPr>
@@ -4099,13 +4023,8 @@
           <a:p>
             <a:r>
               <a:rPr lang="pt-BR" sz="1600" dirty="0"/>
-              <a:t>2</a:t>
-            </a:r>
-            <a:r>
-              <a:rPr lang="pt-BR" sz="1600" dirty="0" smtClean="0"/>
-              <a:t>. Desmarcar agendamento</a:t>
-            </a:r>
-            <a:endParaRPr lang="pt-BR" sz="1600" dirty="0"/>
+              <a:t>2. Desmarcar agendamento</a:t>
+            </a:r>
           </a:p>
         </p:txBody>
       </p:sp>
@@ -4114,7 +4033,7 @@
           <p:cNvPr id="14" name="CaixaDeTexto 13">
             <a:extLst>
               <a:ext uri="{FF2B5EF4-FFF2-40B4-BE49-F238E27FC236}">
-                <a16:creationId xmlns="" xmlns:a16="http://schemas.microsoft.com/office/drawing/2014/main" id="{49353DD0-8323-48AF-9FBB-2D99D9ECEA22}"/>
+                <a16:creationId xmlns:a16="http://schemas.microsoft.com/office/drawing/2014/main" xmlns="" id="{49353DD0-8323-48AF-9FBB-2D99D9ECEA22}"/>
               </a:ext>
             </a:extLst>
           </p:cNvPr>
@@ -4138,10 +4057,9 @@
           <a:lstStyle/>
           <a:p>
             <a:r>
-              <a:rPr lang="pt-BR" sz="1600" dirty="0" smtClean="0"/>
+              <a:rPr lang="pt-BR" sz="1600" dirty="0"/>
               <a:t>3. Receber serviços de beleza</a:t>
             </a:r>
-            <a:endParaRPr lang="pt-BR" sz="1600" dirty="0"/>
           </a:p>
         </p:txBody>
       </p:sp>
@@ -4150,7 +4068,7 @@
           <p:cNvPr id="15" name="CaixaDeTexto 14">
             <a:extLst>
               <a:ext uri="{FF2B5EF4-FFF2-40B4-BE49-F238E27FC236}">
-                <a16:creationId xmlns="" xmlns:a16="http://schemas.microsoft.com/office/drawing/2014/main" id="{49353DD0-8323-48AF-9FBB-2D99D9ECEA22}"/>
+                <a16:creationId xmlns:a16="http://schemas.microsoft.com/office/drawing/2014/main" xmlns="" id="{49353DD0-8323-48AF-9FBB-2D99D9ECEA22}"/>
               </a:ext>
             </a:extLst>
           </p:cNvPr>
@@ -4174,10 +4092,9 @@
           <a:lstStyle/>
           <a:p>
             <a:r>
-              <a:rPr lang="pt-BR" sz="1600" dirty="0" smtClean="0"/>
+              <a:rPr lang="pt-BR" sz="1600" dirty="0"/>
               <a:t>4. Comprar produtos</a:t>
             </a:r>
-            <a:endParaRPr lang="pt-BR" sz="1600" dirty="0"/>
           </a:p>
         </p:txBody>
       </p:sp>
@@ -4224,7 +4141,7 @@
           <p:cNvPr id="18" name="CaixaDeTexto 17">
             <a:extLst>
               <a:ext uri="{FF2B5EF4-FFF2-40B4-BE49-F238E27FC236}">
-                <a16:creationId xmlns="" xmlns:a16="http://schemas.microsoft.com/office/drawing/2014/main" id="{49353DD0-8323-48AF-9FBB-2D99D9ECEA22}"/>
+                <a16:creationId xmlns:a16="http://schemas.microsoft.com/office/drawing/2014/main" xmlns="" id="{49353DD0-8323-48AF-9FBB-2D99D9ECEA22}"/>
               </a:ext>
             </a:extLst>
           </p:cNvPr>
@@ -4248,10 +4165,9 @@
           <a:lstStyle/>
           <a:p>
             <a:r>
-              <a:rPr lang="pt-BR" sz="1600" dirty="0" smtClean="0"/>
+              <a:rPr lang="pt-BR" sz="1600" dirty="0"/>
               <a:t>5. Vender produtos</a:t>
             </a:r>
-            <a:endParaRPr lang="pt-BR" sz="1600" dirty="0"/>
           </a:p>
         </p:txBody>
       </p:sp>
@@ -4290,7 +4206,7 @@
           <p:cNvPr id="2" name="Retângulo: Cantos Arredondados 1">
             <a:extLst>
               <a:ext uri="{FF2B5EF4-FFF2-40B4-BE49-F238E27FC236}">
-                <a16:creationId xmlns="" xmlns:a16="http://schemas.microsoft.com/office/drawing/2014/main" id="{71E86D7D-916F-498B-9151-1FC00881AA4A}"/>
+                <a16:creationId xmlns:a16="http://schemas.microsoft.com/office/drawing/2014/main" xmlns="" id="{71E86D7D-916F-498B-9151-1FC00881AA4A}"/>
               </a:ext>
             </a:extLst>
           </p:cNvPr>
@@ -4353,7 +4269,7 @@
           <p:cNvPr id="3" name="Conector reto 2">
             <a:extLst>
               <a:ext uri="{FF2B5EF4-FFF2-40B4-BE49-F238E27FC236}">
-                <a16:creationId xmlns="" xmlns:a16="http://schemas.microsoft.com/office/drawing/2014/main" id="{4212E35A-FE4C-44CD-B347-634311C873C1}"/>
+                <a16:creationId xmlns:a16="http://schemas.microsoft.com/office/drawing/2014/main" xmlns="" id="{4212E35A-FE4C-44CD-B347-634311C873C1}"/>
               </a:ext>
             </a:extLst>
           </p:cNvPr>
@@ -4391,7 +4307,7 @@
           <p:cNvPr id="4" name="Retângulo 3">
             <a:extLst>
               <a:ext uri="{FF2B5EF4-FFF2-40B4-BE49-F238E27FC236}">
-                <a16:creationId xmlns="" xmlns:a16="http://schemas.microsoft.com/office/drawing/2014/main" id="{A3F19016-7822-438C-9A2A-99580F97FBEA}"/>
+                <a16:creationId xmlns:a16="http://schemas.microsoft.com/office/drawing/2014/main" xmlns="" id="{A3F19016-7822-438C-9A2A-99580F97FBEA}"/>
               </a:ext>
             </a:extLst>
           </p:cNvPr>
@@ -4447,7 +4363,7 @@
           <p:cNvPr id="5" name="CaixaDeTexto 4">
             <a:extLst>
               <a:ext uri="{FF2B5EF4-FFF2-40B4-BE49-F238E27FC236}">
-                <a16:creationId xmlns="" xmlns:a16="http://schemas.microsoft.com/office/drawing/2014/main" id="{A88EB1D4-EA7B-4240-B245-D0093B79AE23}"/>
+                <a16:creationId xmlns:a16="http://schemas.microsoft.com/office/drawing/2014/main" xmlns="" id="{A88EB1D4-EA7B-4240-B245-D0093B79AE23}"/>
               </a:ext>
             </a:extLst>
           </p:cNvPr>
@@ -4484,7 +4400,7 @@
           <p:cNvPr id="7" name="Cubo 6">
             <a:extLst>
               <a:ext uri="{FF2B5EF4-FFF2-40B4-BE49-F238E27FC236}">
-                <a16:creationId xmlns="" xmlns:a16="http://schemas.microsoft.com/office/drawing/2014/main" id="{7CB94480-861D-47BC-8F39-38467A02CD1E}"/>
+                <a16:creationId xmlns:a16="http://schemas.microsoft.com/office/drawing/2014/main" xmlns="" id="{7CB94480-861D-47BC-8F39-38467A02CD1E}"/>
               </a:ext>
             </a:extLst>
           </p:cNvPr>
@@ -4559,7 +4475,7 @@
           <p:cNvPr id="8" name="Retângulo: Cantos Superiores Recortados 7">
             <a:extLst>
               <a:ext uri="{FF2B5EF4-FFF2-40B4-BE49-F238E27FC236}">
-                <a16:creationId xmlns="" xmlns:a16="http://schemas.microsoft.com/office/drawing/2014/main" id="{66ABF582-FC6C-4BC7-BEC3-0B92613B624C}"/>
+                <a16:creationId xmlns:a16="http://schemas.microsoft.com/office/drawing/2014/main" xmlns="" id="{66ABF582-FC6C-4BC7-BEC3-0B92613B624C}"/>
               </a:ext>
             </a:extLst>
           </p:cNvPr>
@@ -4595,20 +4511,8 @@
           <a:p>
             <a:pPr algn="ctr"/>
             <a:r>
-              <a:rPr lang="pt-BR" sz="1600" b="1" dirty="0" smtClean="0"/>
-              <a:t>Atender o </a:t>
-            </a:r>
-            <a:r>
               <a:rPr lang="pt-BR" sz="1600" b="1" dirty="0"/>
-              <a:t>cliente para </a:t>
-            </a:r>
-            <a:r>
-              <a:rPr lang="pt-BR" sz="1600" b="1" dirty="0" smtClean="0"/>
-              <a:t>agendar o </a:t>
-            </a:r>
-            <a:r>
-              <a:rPr lang="pt-BR" sz="1600" b="1" dirty="0"/>
-              <a:t>serviço </a:t>
+              <a:t>Atender o cliente para agendar o serviço </a:t>
             </a:r>
           </a:p>
         </p:txBody>
@@ -4618,7 +4522,7 @@
           <p:cNvPr id="10" name="Conector reto 9">
             <a:extLst>
               <a:ext uri="{FF2B5EF4-FFF2-40B4-BE49-F238E27FC236}">
-                <a16:creationId xmlns="" xmlns:a16="http://schemas.microsoft.com/office/drawing/2014/main" id="{4AF25932-ADA8-46C6-B2BA-860A0C6900F9}"/>
+                <a16:creationId xmlns:a16="http://schemas.microsoft.com/office/drawing/2014/main" xmlns="" id="{4AF25932-ADA8-46C6-B2BA-860A0C6900F9}"/>
               </a:ext>
             </a:extLst>
           </p:cNvPr>
@@ -4656,7 +4560,7 @@
           <p:cNvPr id="11" name="Título 1">
             <a:extLst>
               <a:ext uri="{FF2B5EF4-FFF2-40B4-BE49-F238E27FC236}">
-                <a16:creationId xmlns="" xmlns:a16="http://schemas.microsoft.com/office/drawing/2014/main" id="{411917F5-2B7E-47D6-8EB7-3137A1AF18C2}"/>
+                <a16:creationId xmlns:a16="http://schemas.microsoft.com/office/drawing/2014/main" xmlns="" id="{411917F5-2B7E-47D6-8EB7-3137A1AF18C2}"/>
               </a:ext>
             </a:extLst>
           </p:cNvPr>
@@ -4700,20 +4604,15 @@
           <a:p>
             <a:pPr algn="ctr"/>
             <a:r>
-              <a:rPr lang="pt-BR" sz="2800" b="1" dirty="0" smtClean="0">
+              <a:rPr lang="pt-BR" sz="2800" b="1" dirty="0">
                 <a:latin typeface="+mn-lt"/>
               </a:rPr>
               <a:t>Cenário: </a:t>
             </a:r>
             <a:r>
               <a:rPr lang="pt-BR" sz="2800" dirty="0"/>
-              <a:t>Obter </a:t>
-            </a:r>
-            <a:r>
-              <a:rPr lang="pt-BR" sz="2800" dirty="0" smtClean="0"/>
-              <a:t>agendamento</a:t>
-            </a:r>
-            <a:endParaRPr lang="pt-BR" sz="2800" dirty="0"/>
+              <a:t>Obter agendamento</a:t>
+            </a:r>
           </a:p>
         </p:txBody>
       </p:sp>
@@ -4722,7 +4621,7 @@
           <p:cNvPr id="13" name="Texto Explicativo: Linha com Borda e Ênfase 12">
             <a:extLst>
               <a:ext uri="{FF2B5EF4-FFF2-40B4-BE49-F238E27FC236}">
-                <a16:creationId xmlns="" xmlns:a16="http://schemas.microsoft.com/office/drawing/2014/main" id="{08021082-5B27-4F2A-BC91-C7CC9C0DA57A}"/>
+                <a16:creationId xmlns:a16="http://schemas.microsoft.com/office/drawing/2014/main" xmlns="" id="{08021082-5B27-4F2A-BC91-C7CC9C0DA57A}"/>
               </a:ext>
             </a:extLst>
           </p:cNvPr>
@@ -4771,7 +4670,7 @@
           <p:cNvPr id="15" name="CaixaDeTexto 14">
             <a:extLst>
               <a:ext uri="{FF2B5EF4-FFF2-40B4-BE49-F238E27FC236}">
-                <a16:creationId xmlns="" xmlns:a16="http://schemas.microsoft.com/office/drawing/2014/main" id="{6630DB26-F517-4223-98D3-D25B79988A8F}"/>
+                <a16:creationId xmlns:a16="http://schemas.microsoft.com/office/drawing/2014/main" xmlns="" id="{6630DB26-F517-4223-98D3-D25B79988A8F}"/>
               </a:ext>
             </a:extLst>
           </p:cNvPr>
@@ -4814,7 +4713,7 @@
           <p:cNvPr id="17" name="Texto Explicativo: Linha com Borda e Ênfase 16">
             <a:extLst>
               <a:ext uri="{FF2B5EF4-FFF2-40B4-BE49-F238E27FC236}">
-                <a16:creationId xmlns="" xmlns:a16="http://schemas.microsoft.com/office/drawing/2014/main" id="{10A17498-E3E5-4F42-9E74-C61B8CCB0DD1}"/>
+                <a16:creationId xmlns:a16="http://schemas.microsoft.com/office/drawing/2014/main" xmlns="" id="{10A17498-E3E5-4F42-9E74-C61B8CCB0DD1}"/>
               </a:ext>
             </a:extLst>
           </p:cNvPr>
@@ -4863,7 +4762,7 @@
           <p:cNvPr id="19" name="CaixaDeTexto 18">
             <a:extLst>
               <a:ext uri="{FF2B5EF4-FFF2-40B4-BE49-F238E27FC236}">
-                <a16:creationId xmlns="" xmlns:a16="http://schemas.microsoft.com/office/drawing/2014/main" id="{295B6632-1F19-4CDC-88A5-EE83C1794E9C}"/>
+                <a16:creationId xmlns:a16="http://schemas.microsoft.com/office/drawing/2014/main" xmlns="" id="{295B6632-1F19-4CDC-88A5-EE83C1794E9C}"/>
               </a:ext>
             </a:extLst>
           </p:cNvPr>
@@ -4896,13 +4795,8 @@
             <a:pPr algn="ctr"/>
             <a:r>
               <a:rPr lang="pt-BR" sz="1400" b="1" dirty="0"/>
-              <a:t>“Atender o cliente para agendar o </a:t>
-            </a:r>
-            <a:r>
-              <a:rPr lang="pt-BR" sz="1400" b="1" dirty="0" smtClean="0"/>
-              <a:t>serviço”</a:t>
-            </a:r>
-            <a:endParaRPr lang="pt-BR" sz="1400" b="1" dirty="0"/>
+              <a:t>“Atender o cliente para agendar o serviço”</a:t>
+            </a:r>
           </a:p>
         </p:txBody>
       </p:sp>
@@ -4941,7 +4835,7 @@
           <p:cNvPr id="2" name="Retângulo: Cantos Arredondados 1">
             <a:extLst>
               <a:ext uri="{FF2B5EF4-FFF2-40B4-BE49-F238E27FC236}">
-                <a16:creationId xmlns="" xmlns:a16="http://schemas.microsoft.com/office/drawing/2014/main" id="{71E86D7D-916F-498B-9151-1FC00881AA4A}"/>
+                <a16:creationId xmlns:a16="http://schemas.microsoft.com/office/drawing/2014/main" xmlns="" id="{71E86D7D-916F-498B-9151-1FC00881AA4A}"/>
               </a:ext>
             </a:extLst>
           </p:cNvPr>
@@ -5004,7 +4898,7 @@
           <p:cNvPr id="3" name="Conector reto 2">
             <a:extLst>
               <a:ext uri="{FF2B5EF4-FFF2-40B4-BE49-F238E27FC236}">
-                <a16:creationId xmlns="" xmlns:a16="http://schemas.microsoft.com/office/drawing/2014/main" id="{4212E35A-FE4C-44CD-B347-634311C873C1}"/>
+                <a16:creationId xmlns:a16="http://schemas.microsoft.com/office/drawing/2014/main" xmlns="" id="{4212E35A-FE4C-44CD-B347-634311C873C1}"/>
               </a:ext>
             </a:extLst>
           </p:cNvPr>
@@ -5042,7 +4936,7 @@
           <p:cNvPr id="4" name="Retângulo 3">
             <a:extLst>
               <a:ext uri="{FF2B5EF4-FFF2-40B4-BE49-F238E27FC236}">
-                <a16:creationId xmlns="" xmlns:a16="http://schemas.microsoft.com/office/drawing/2014/main" id="{A3F19016-7822-438C-9A2A-99580F97FBEA}"/>
+                <a16:creationId xmlns:a16="http://schemas.microsoft.com/office/drawing/2014/main" xmlns="" id="{A3F19016-7822-438C-9A2A-99580F97FBEA}"/>
               </a:ext>
             </a:extLst>
           </p:cNvPr>
@@ -5098,7 +4992,7 @@
           <p:cNvPr id="5" name="CaixaDeTexto 4">
             <a:extLst>
               <a:ext uri="{FF2B5EF4-FFF2-40B4-BE49-F238E27FC236}">
-                <a16:creationId xmlns="" xmlns:a16="http://schemas.microsoft.com/office/drawing/2014/main" id="{A88EB1D4-EA7B-4240-B245-D0093B79AE23}"/>
+                <a16:creationId xmlns:a16="http://schemas.microsoft.com/office/drawing/2014/main" xmlns="" id="{A88EB1D4-EA7B-4240-B245-D0093B79AE23}"/>
               </a:ext>
             </a:extLst>
           </p:cNvPr>
@@ -5135,7 +5029,7 @@
           <p:cNvPr id="7" name="Cubo 6">
             <a:extLst>
               <a:ext uri="{FF2B5EF4-FFF2-40B4-BE49-F238E27FC236}">
-                <a16:creationId xmlns="" xmlns:a16="http://schemas.microsoft.com/office/drawing/2014/main" id="{7CB94480-861D-47BC-8F39-38467A02CD1E}"/>
+                <a16:creationId xmlns:a16="http://schemas.microsoft.com/office/drawing/2014/main" xmlns="" id="{7CB94480-861D-47BC-8F39-38467A02CD1E}"/>
               </a:ext>
             </a:extLst>
           </p:cNvPr>
@@ -5210,7 +5104,7 @@
           <p:cNvPr id="8" name="Retângulo: Cantos Superiores Recortados 7">
             <a:extLst>
               <a:ext uri="{FF2B5EF4-FFF2-40B4-BE49-F238E27FC236}">
-                <a16:creationId xmlns="" xmlns:a16="http://schemas.microsoft.com/office/drawing/2014/main" id="{66ABF582-FC6C-4BC7-BEC3-0B92613B624C}"/>
+                <a16:creationId xmlns:a16="http://schemas.microsoft.com/office/drawing/2014/main" xmlns="" id="{66ABF582-FC6C-4BC7-BEC3-0B92613B624C}"/>
               </a:ext>
             </a:extLst>
           </p:cNvPr>
@@ -5247,21 +5141,8 @@
             <a:pPr algn="ctr"/>
             <a:r>
               <a:rPr lang="pt-BR" sz="1600" b="1" dirty="0"/>
-              <a:t>Atender o cliente para </a:t>
-            </a:r>
-            <a:r>
-              <a:rPr lang="pt-BR" sz="1600" b="1" dirty="0" smtClean="0"/>
-              <a:t>desmarcar o </a:t>
-            </a:r>
-            <a:r>
-              <a:rPr lang="pt-BR" sz="1600" b="1" dirty="0"/>
-              <a:t>serviço </a:t>
-            </a:r>
-            <a:r>
-              <a:rPr lang="pt-BR" sz="1600" b="1" dirty="0" smtClean="0"/>
-              <a:t>agendado</a:t>
-            </a:r>
-            <a:endParaRPr lang="pt-BR" sz="1600" b="1" dirty="0"/>
+              <a:t>Atender o cliente para desmarcar o serviço agendado</a:t>
+            </a:r>
           </a:p>
         </p:txBody>
       </p:sp>
@@ -5270,7 +5151,7 @@
           <p:cNvPr id="10" name="Conector reto 9">
             <a:extLst>
               <a:ext uri="{FF2B5EF4-FFF2-40B4-BE49-F238E27FC236}">
-                <a16:creationId xmlns="" xmlns:a16="http://schemas.microsoft.com/office/drawing/2014/main" id="{4AF25932-ADA8-46C6-B2BA-860A0C6900F9}"/>
+                <a16:creationId xmlns:a16="http://schemas.microsoft.com/office/drawing/2014/main" xmlns="" id="{4AF25932-ADA8-46C6-B2BA-860A0C6900F9}"/>
               </a:ext>
             </a:extLst>
           </p:cNvPr>
@@ -5308,7 +5189,7 @@
           <p:cNvPr id="11" name="Título 1">
             <a:extLst>
               <a:ext uri="{FF2B5EF4-FFF2-40B4-BE49-F238E27FC236}">
-                <a16:creationId xmlns="" xmlns:a16="http://schemas.microsoft.com/office/drawing/2014/main" id="{411917F5-2B7E-47D6-8EB7-3137A1AF18C2}"/>
+                <a16:creationId xmlns:a16="http://schemas.microsoft.com/office/drawing/2014/main" xmlns="" id="{411917F5-2B7E-47D6-8EB7-3137A1AF18C2}"/>
               </a:ext>
             </a:extLst>
           </p:cNvPr>
@@ -5352,7 +5233,7 @@
           <a:p>
             <a:pPr algn="ctr"/>
             <a:r>
-              <a:rPr lang="pt-BR" sz="2800" b="1" dirty="0" smtClean="0">
+              <a:rPr lang="pt-BR" sz="2800" b="1" dirty="0">
                 <a:latin typeface="+mn-lt"/>
               </a:rPr>
               <a:t>Cenário: </a:t>
@@ -5409,7 +5290,7 @@
           <p:cNvPr id="2" name="Retângulo: Cantos Arredondados 1">
             <a:extLst>
               <a:ext uri="{FF2B5EF4-FFF2-40B4-BE49-F238E27FC236}">
-                <a16:creationId xmlns="" xmlns:a16="http://schemas.microsoft.com/office/drawing/2014/main" id="{71E86D7D-916F-498B-9151-1FC00881AA4A}"/>
+                <a16:creationId xmlns:a16="http://schemas.microsoft.com/office/drawing/2014/main" xmlns="" id="{71E86D7D-916F-498B-9151-1FC00881AA4A}"/>
               </a:ext>
             </a:extLst>
           </p:cNvPr>
@@ -5472,7 +5353,7 @@
           <p:cNvPr id="3" name="Conector reto 2">
             <a:extLst>
               <a:ext uri="{FF2B5EF4-FFF2-40B4-BE49-F238E27FC236}">
-                <a16:creationId xmlns="" xmlns:a16="http://schemas.microsoft.com/office/drawing/2014/main" id="{4212E35A-FE4C-44CD-B347-634311C873C1}"/>
+                <a16:creationId xmlns:a16="http://schemas.microsoft.com/office/drawing/2014/main" xmlns="" id="{4212E35A-FE4C-44CD-B347-634311C873C1}"/>
               </a:ext>
             </a:extLst>
           </p:cNvPr>
@@ -5511,7 +5392,7 @@
           <p:cNvPr id="4" name="Retângulo 3">
             <a:extLst>
               <a:ext uri="{FF2B5EF4-FFF2-40B4-BE49-F238E27FC236}">
-                <a16:creationId xmlns="" xmlns:a16="http://schemas.microsoft.com/office/drawing/2014/main" id="{A3F19016-7822-438C-9A2A-99580F97FBEA}"/>
+                <a16:creationId xmlns:a16="http://schemas.microsoft.com/office/drawing/2014/main" xmlns="" id="{A3F19016-7822-438C-9A2A-99580F97FBEA}"/>
               </a:ext>
             </a:extLst>
           </p:cNvPr>
@@ -5567,7 +5448,7 @@
           <p:cNvPr id="5" name="CaixaDeTexto 4">
             <a:extLst>
               <a:ext uri="{FF2B5EF4-FFF2-40B4-BE49-F238E27FC236}">
-                <a16:creationId xmlns="" xmlns:a16="http://schemas.microsoft.com/office/drawing/2014/main" id="{A88EB1D4-EA7B-4240-B245-D0093B79AE23}"/>
+                <a16:creationId xmlns:a16="http://schemas.microsoft.com/office/drawing/2014/main" xmlns="" id="{A88EB1D4-EA7B-4240-B245-D0093B79AE23}"/>
               </a:ext>
             </a:extLst>
           </p:cNvPr>
@@ -5604,7 +5485,7 @@
           <p:cNvPr id="7" name="Cubo 6">
             <a:extLst>
               <a:ext uri="{FF2B5EF4-FFF2-40B4-BE49-F238E27FC236}">
-                <a16:creationId xmlns="" xmlns:a16="http://schemas.microsoft.com/office/drawing/2014/main" id="{7CB94480-861D-47BC-8F39-38467A02CD1E}"/>
+                <a16:creationId xmlns:a16="http://schemas.microsoft.com/office/drawing/2014/main" xmlns="" id="{7CB94480-861D-47BC-8F39-38467A02CD1E}"/>
               </a:ext>
             </a:extLst>
           </p:cNvPr>
@@ -5613,7 +5494,7 @@
         </p:nvSpPr>
         <p:spPr>
           <a:xfrm>
-            <a:off x="5274642" y="1994038"/>
+            <a:off x="5295601" y="2022888"/>
             <a:ext cx="1323923" cy="808382"/>
           </a:xfrm>
           <a:prstGeom prst="cube">
@@ -5640,7 +5521,7 @@
           <a:p>
             <a:pPr algn="ctr"/>
             <a:r>
-              <a:rPr lang="pt-BR" sz="1600" b="1" dirty="0" smtClean="0">
+              <a:rPr lang="pt-BR" sz="1600" b="1" dirty="0">
                 <a:solidFill>
                   <a:schemeClr val="tx1">
                     <a:lumMod val="95000"/>
@@ -5650,14 +5531,6 @@
               </a:rPr>
               <a:t>Recepção</a:t>
             </a:r>
-            <a:endParaRPr lang="pt-BR" sz="1600" b="1" dirty="0">
-              <a:solidFill>
-                <a:schemeClr val="tx1">
-                  <a:lumMod val="95000"/>
-                  <a:lumOff val="5000"/>
-                </a:schemeClr>
-              </a:solidFill>
-            </a:endParaRPr>
           </a:p>
         </p:txBody>
       </p:sp>
@@ -5666,7 +5539,7 @@
           <p:cNvPr id="11" name="Título 1">
             <a:extLst>
               <a:ext uri="{FF2B5EF4-FFF2-40B4-BE49-F238E27FC236}">
-                <a16:creationId xmlns="" xmlns:a16="http://schemas.microsoft.com/office/drawing/2014/main" id="{411917F5-2B7E-47D6-8EB7-3137A1AF18C2}"/>
+                <a16:creationId xmlns:a16="http://schemas.microsoft.com/office/drawing/2014/main" xmlns="" id="{411917F5-2B7E-47D6-8EB7-3137A1AF18C2}"/>
               </a:ext>
             </a:extLst>
           </p:cNvPr>
@@ -5710,7 +5583,7 @@
           <a:p>
             <a:pPr algn="ctr"/>
             <a:r>
-              <a:rPr lang="pt-BR" sz="2800" b="1" dirty="0" smtClean="0">
+              <a:rPr lang="pt-BR" sz="2800" b="1" dirty="0">
                 <a:latin typeface="+mn-lt"/>
               </a:rPr>
               <a:t>Cenário: </a:t>
@@ -5730,10 +5603,10 @@
       </p:sp>
       <p:sp>
         <p:nvSpPr>
-          <p:cNvPr id="13" name="Retângulo: Cantos Superiores Recortados 7">
-            <a:extLst>
-              <a:ext uri="{FF2B5EF4-FFF2-40B4-BE49-F238E27FC236}">
-                <a16:creationId xmlns="" xmlns:a16="http://schemas.microsoft.com/office/drawing/2014/main" id="{66ABF582-FC6C-4BC7-BEC3-0B92613B624C}"/>
+          <p:cNvPr id="14" name="Retângulo: Cantos Superiores Recortados 7">
+            <a:extLst>
+              <a:ext uri="{FF2B5EF4-FFF2-40B4-BE49-F238E27FC236}">
+                <a16:creationId xmlns:a16="http://schemas.microsoft.com/office/drawing/2014/main" xmlns="" id="{66ABF582-FC6C-4BC7-BEC3-0B92613B624C}"/>
               </a:ext>
             </a:extLst>
           </p:cNvPr>
@@ -5742,8 +5615,8 @@
         </p:nvSpPr>
         <p:spPr>
           <a:xfrm>
-            <a:off x="9424227" y="4161183"/>
-            <a:ext cx="1220652" cy="808382"/>
+            <a:off x="8610008" y="4161183"/>
+            <a:ext cx="1309274" cy="808382"/>
           </a:xfrm>
           <a:prstGeom prst="snip2SameRect">
             <a:avLst/>
@@ -5777,10 +5650,10 @@
       </p:sp>
       <p:sp>
         <p:nvSpPr>
-          <p:cNvPr id="14" name="Retângulo: Cantos Superiores Recortados 7">
-            <a:extLst>
-              <a:ext uri="{FF2B5EF4-FFF2-40B4-BE49-F238E27FC236}">
-                <a16:creationId xmlns="" xmlns:a16="http://schemas.microsoft.com/office/drawing/2014/main" id="{66ABF582-FC6C-4BC7-BEC3-0B92613B624C}"/>
+          <p:cNvPr id="15" name="Retângulo: Cantos Superiores Recortados 7">
+            <a:extLst>
+              <a:ext uri="{FF2B5EF4-FFF2-40B4-BE49-F238E27FC236}">
+                <a16:creationId xmlns:a16="http://schemas.microsoft.com/office/drawing/2014/main" xmlns="" id="{66ABF582-FC6C-4BC7-BEC3-0B92613B624C}"/>
               </a:ext>
             </a:extLst>
           </p:cNvPr>
@@ -5789,8 +5662,8 @@
         </p:nvSpPr>
         <p:spPr>
           <a:xfrm>
-            <a:off x="7999826" y="4161183"/>
-            <a:ext cx="1309274" cy="808382"/>
+            <a:off x="7076544" y="4168701"/>
+            <a:ext cx="1095376" cy="808382"/>
           </a:xfrm>
           <a:prstGeom prst="snip2SameRect">
             <a:avLst/>
@@ -5824,10 +5697,10 @@
       </p:sp>
       <p:sp>
         <p:nvSpPr>
-          <p:cNvPr id="15" name="Retângulo: Cantos Superiores Recortados 7">
-            <a:extLst>
-              <a:ext uri="{FF2B5EF4-FFF2-40B4-BE49-F238E27FC236}">
-                <a16:creationId xmlns="" xmlns:a16="http://schemas.microsoft.com/office/drawing/2014/main" id="{66ABF582-FC6C-4BC7-BEC3-0B92613B624C}"/>
+          <p:cNvPr id="17" name="Cubo 16">
+            <a:extLst>
+              <a:ext uri="{FF2B5EF4-FFF2-40B4-BE49-F238E27FC236}">
+                <a16:creationId xmlns:a16="http://schemas.microsoft.com/office/drawing/2014/main" xmlns="" id="{7CB94480-861D-47BC-8F39-38467A02CD1E}"/>
               </a:ext>
             </a:extLst>
           </p:cNvPr>
@@ -5836,54 +5709,7 @@
         </p:nvSpPr>
         <p:spPr>
           <a:xfrm>
-            <a:off x="6735123" y="4161183"/>
-            <a:ext cx="1095376" cy="808382"/>
-          </a:xfrm>
-          <a:prstGeom prst="snip2SameRect">
-            <a:avLst/>
-          </a:prstGeom>
-        </p:spPr>
-        <p:style>
-          <a:lnRef idx="1">
-            <a:schemeClr val="dk1"/>
-          </a:lnRef>
-          <a:fillRef idx="3">
-            <a:schemeClr val="dk1"/>
-          </a:fillRef>
-          <a:effectRef idx="2">
-            <a:schemeClr val="dk1"/>
-          </a:effectRef>
-          <a:fontRef idx="minor">
-            <a:schemeClr val="lt1"/>
-          </a:fontRef>
-        </p:style>
-        <p:txBody>
-          <a:bodyPr rtlCol="0" anchor="ctr"/>
-          <a:lstStyle/>
-          <a:p>
-            <a:pPr algn="ctr"/>
-            <a:r>
-              <a:rPr lang="pt-BR" sz="1200" b="1" dirty="0"/>
-              <a:t>Receber o cliente para realizar o serviço </a:t>
-            </a:r>
-          </a:p>
-        </p:txBody>
-      </p:sp>
-      <p:sp>
-        <p:nvSpPr>
-          <p:cNvPr id="17" name="Cubo 16">
-            <a:extLst>
-              <a:ext uri="{FF2B5EF4-FFF2-40B4-BE49-F238E27FC236}">
-                <a16:creationId xmlns="" xmlns:a16="http://schemas.microsoft.com/office/drawing/2014/main" id="{7CB94480-861D-47BC-8F39-38467A02CD1E}"/>
-              </a:ext>
-            </a:extLst>
-          </p:cNvPr>
-          <p:cNvSpPr/>
-          <p:nvPr/>
-        </p:nvSpPr>
-        <p:spPr>
-          <a:xfrm>
-            <a:off x="6735123" y="1994038"/>
+            <a:off x="7076544" y="2016496"/>
             <a:ext cx="1203774" cy="808382"/>
           </a:xfrm>
           <a:prstGeom prst="cube">
@@ -5910,7 +5736,7 @@
           <a:p>
             <a:pPr algn="ctr"/>
             <a:r>
-              <a:rPr lang="pt-BR" sz="1600" b="1" dirty="0" smtClean="0">
+              <a:rPr lang="pt-BR" sz="1600" b="1" dirty="0">
                 <a:solidFill>
                   <a:schemeClr val="tx1">
                     <a:lumMod val="95000"/>
@@ -5920,14 +5746,6 @@
               </a:rPr>
               <a:t>Cortes</a:t>
             </a:r>
-            <a:endParaRPr lang="pt-BR" sz="1600" b="1" dirty="0">
-              <a:solidFill>
-                <a:schemeClr val="tx1">
-                  <a:lumMod val="95000"/>
-                  <a:lumOff val="5000"/>
-                </a:schemeClr>
-              </a:solidFill>
-            </a:endParaRPr>
           </a:p>
         </p:txBody>
       </p:sp>
@@ -5936,7 +5754,7 @@
           <p:cNvPr id="18" name="Cubo 17">
             <a:extLst>
               <a:ext uri="{FF2B5EF4-FFF2-40B4-BE49-F238E27FC236}">
-                <a16:creationId xmlns="" xmlns:a16="http://schemas.microsoft.com/office/drawing/2014/main" id="{7CB94480-861D-47BC-8F39-38467A02CD1E}"/>
+                <a16:creationId xmlns:a16="http://schemas.microsoft.com/office/drawing/2014/main" xmlns="" id="{7CB94480-861D-47BC-8F39-38467A02CD1E}"/>
               </a:ext>
             </a:extLst>
           </p:cNvPr>
@@ -5945,7 +5763,7 @@
         </p:nvSpPr>
         <p:spPr>
           <a:xfrm>
-            <a:off x="7999826" y="1984513"/>
+            <a:off x="8676716" y="1984513"/>
             <a:ext cx="1256524" cy="808382"/>
           </a:xfrm>
           <a:prstGeom prst="cube">
@@ -5972,7 +5790,7 @@
           <a:p>
             <a:pPr algn="ctr"/>
             <a:r>
-              <a:rPr lang="pt-BR" sz="1600" b="1" dirty="0" smtClean="0">
+              <a:rPr lang="pt-BR" sz="1600" b="1" dirty="0">
                 <a:solidFill>
                   <a:schemeClr val="tx1">
                     <a:lumMod val="95000"/>
@@ -5982,23 +5800,15 @@
               </a:rPr>
               <a:t>Depilação</a:t>
             </a:r>
-            <a:endParaRPr lang="pt-BR" sz="1600" b="1" dirty="0">
-              <a:solidFill>
-                <a:schemeClr val="tx1">
-                  <a:lumMod val="95000"/>
-                  <a:lumOff val="5000"/>
-                </a:schemeClr>
-              </a:solidFill>
-            </a:endParaRPr>
-          </a:p>
-        </p:txBody>
-      </p:sp>
-      <p:sp>
-        <p:nvSpPr>
-          <p:cNvPr id="19" name="Cubo 18">
-            <a:extLst>
-              <a:ext uri="{FF2B5EF4-FFF2-40B4-BE49-F238E27FC236}">
-                <a16:creationId xmlns="" xmlns:a16="http://schemas.microsoft.com/office/drawing/2014/main" id="{7CB94480-861D-47BC-8F39-38467A02CD1E}"/>
+          </a:p>
+        </p:txBody>
+      </p:sp>
+      <p:sp>
+        <p:nvSpPr>
+          <p:cNvPr id="23" name="Retângulo: Cantos Superiores Recortados 7">
+            <a:extLst>
+              <a:ext uri="{FF2B5EF4-FFF2-40B4-BE49-F238E27FC236}">
+                <a16:creationId xmlns:a16="http://schemas.microsoft.com/office/drawing/2014/main" xmlns="" id="{66ABF582-FC6C-4BC7-BEC3-0B92613B624C}"/>
               </a:ext>
             </a:extLst>
           </p:cNvPr>
@@ -6007,74 +5817,7 @@
         </p:nvSpPr>
         <p:spPr>
           <a:xfrm>
-            <a:off x="9351963" y="1967948"/>
-            <a:ext cx="1203774" cy="808382"/>
-          </a:xfrm>
-          <a:prstGeom prst="cube">
-            <a:avLst/>
-          </a:prstGeom>
-          <a:ln>
-            <a:solidFill>
-              <a:schemeClr val="tx1"/>
-            </a:solidFill>
-          </a:ln>
-        </p:spPr>
-        <p:style>
-          <a:lnRef idx="1">
-            <a:schemeClr val="dk1"/>
-          </a:lnRef>
-          <a:fillRef idx="2">
-            <a:schemeClr val="dk1"/>
-          </a:fillRef>
-          <a:effectRef idx="1">
-            <a:schemeClr val="dk1"/>
-          </a:effectRef>
-          <a:fontRef idx="minor">
-            <a:schemeClr val="dk1"/>
-          </a:fontRef>
-        </p:style>
-        <p:txBody>
-          <a:bodyPr rtlCol="0" anchor="ctr"/>
-          <a:lstStyle/>
-          <a:p>
-            <a:pPr algn="ctr"/>
-            <a:r>
-              <a:rPr lang="pt-BR" sz="1600" b="1" dirty="0" smtClean="0">
-                <a:solidFill>
-                  <a:schemeClr val="tx1">
-                    <a:lumMod val="95000"/>
-                    <a:lumOff val="5000"/>
-                  </a:schemeClr>
-                </a:solidFill>
-              </a:rPr>
-              <a:t>Recepção</a:t>
-            </a:r>
-            <a:endParaRPr lang="pt-BR" sz="1600" b="1" dirty="0">
-              <a:solidFill>
-                <a:schemeClr val="tx1">
-                  <a:lumMod val="95000"/>
-                  <a:lumOff val="5000"/>
-                </a:schemeClr>
-              </a:solidFill>
-            </a:endParaRPr>
-          </a:p>
-        </p:txBody>
-      </p:sp>
-      <p:sp>
-        <p:nvSpPr>
-          <p:cNvPr id="23" name="Retângulo: Cantos Superiores Recortados 7">
-            <a:extLst>
-              <a:ext uri="{FF2B5EF4-FFF2-40B4-BE49-F238E27FC236}">
-                <a16:creationId xmlns="" xmlns:a16="http://schemas.microsoft.com/office/drawing/2014/main" id="{66ABF582-FC6C-4BC7-BEC3-0B92613B624C}"/>
-              </a:ext>
-            </a:extLst>
-          </p:cNvPr>
-          <p:cNvSpPr/>
-          <p:nvPr/>
-        </p:nvSpPr>
-        <p:spPr>
-          <a:xfrm>
-            <a:off x="3868874" y="4161183"/>
+            <a:off x="4311222" y="4150075"/>
             <a:ext cx="1170953" cy="808382"/>
           </a:xfrm>
           <a:prstGeom prst="snip2SameRect">
@@ -6101,7 +5844,7 @@
           <a:p>
             <a:pPr algn="ctr"/>
             <a:r>
-              <a:rPr lang="pt-BR" sz="1200" b="1" dirty="0" smtClean="0"/>
+              <a:rPr lang="pt-BR" sz="1200" b="1" dirty="0"/>
               <a:t>Finalizar Serviço</a:t>
             </a:r>
           </a:p>
@@ -6117,8 +5860,8 @@
         </p:nvCxnSpPr>
         <p:spPr>
           <a:xfrm flipH="1">
-            <a:off x="4454351" y="2802420"/>
-            <a:ext cx="820291" cy="1358763"/>
+            <a:off x="4896699" y="2839303"/>
+            <a:ext cx="503992" cy="1310772"/>
           </a:xfrm>
           <a:prstGeom prst="line">
             <a:avLst/>
@@ -6149,7 +5892,7 @@
           <p:cNvPr id="16" name="Retângulo: Cantos Superiores Recortados 7">
             <a:extLst>
               <a:ext uri="{FF2B5EF4-FFF2-40B4-BE49-F238E27FC236}">
-                <a16:creationId xmlns="" xmlns:a16="http://schemas.microsoft.com/office/drawing/2014/main" id="{66ABF582-FC6C-4BC7-BEC3-0B92613B624C}"/>
+                <a16:creationId xmlns:a16="http://schemas.microsoft.com/office/drawing/2014/main" xmlns="" id="{66ABF582-FC6C-4BC7-BEC3-0B92613B624C}"/>
               </a:ext>
             </a:extLst>
           </p:cNvPr>
@@ -6158,7 +5901,7 @@
         </p:nvSpPr>
         <p:spPr>
           <a:xfrm>
-            <a:off x="5228284" y="4161183"/>
+            <a:off x="5686547" y="4183641"/>
             <a:ext cx="1170953" cy="808382"/>
           </a:xfrm>
           <a:prstGeom prst="snip2SameRect">
@@ -6185,32 +5928,21 @@
           <a:p>
             <a:pPr algn="ctr"/>
             <a:r>
-              <a:rPr lang="pt-BR" sz="1200" b="1" dirty="0" smtClean="0"/>
-              <a:t>Recepcionar</a:t>
-            </a:r>
-            <a:r>
               <a:rPr lang="pt-BR" sz="1200" b="1" dirty="0"/>
-              <a:t> </a:t>
-            </a:r>
-            <a:r>
-              <a:rPr lang="pt-BR" sz="1200" b="1" dirty="0" smtClean="0"/>
-              <a:t>Cliente</a:t>
-            </a:r>
-            <a:endParaRPr lang="pt-BR" sz="1200" b="1" dirty="0" smtClean="0"/>
+              <a:t>Recepcionar Cliente</a:t>
+            </a:r>
           </a:p>
         </p:txBody>
       </p:sp>
       <p:cxnSp>
         <p:nvCxnSpPr>
           <p:cNvPr id="43" name="Conector reto 42"/>
-          <p:cNvCxnSpPr>
-            <a:stCxn id="7" idx="3"/>
-          </p:cNvCxnSpPr>
+          <p:cNvCxnSpPr/>
           <p:nvPr/>
         </p:nvCxnSpPr>
         <p:spPr>
           <a:xfrm flipH="1">
-            <a:off x="5826042" y="2802420"/>
+            <a:off x="6297408" y="2831270"/>
             <a:ext cx="9514" cy="1358763"/>
           </a:xfrm>
           <a:prstGeom prst="line">
@@ -6245,7 +5977,7 @@
         </p:nvCxnSpPr>
         <p:spPr>
           <a:xfrm>
-            <a:off x="7236817" y="2802420"/>
+            <a:off x="7624232" y="2824878"/>
             <a:ext cx="0" cy="1358763"/>
           </a:xfrm>
           <a:prstGeom prst="line">
@@ -6312,45 +6044,8 @@
         </p:nvCxnSpPr>
         <p:spPr>
           <a:xfrm>
-            <a:off x="8527040" y="2792895"/>
+            <a:off x="9203930" y="2792895"/>
             <a:ext cx="7360" cy="1368288"/>
-          </a:xfrm>
-          <a:prstGeom prst="line">
-            <a:avLst/>
-          </a:prstGeom>
-          <a:ln>
-            <a:solidFill>
-              <a:schemeClr val="tx1"/>
-            </a:solidFill>
-          </a:ln>
-        </p:spPr>
-        <p:style>
-          <a:lnRef idx="1">
-            <a:schemeClr val="accent1"/>
-          </a:lnRef>
-          <a:fillRef idx="0">
-            <a:schemeClr val="accent1"/>
-          </a:fillRef>
-          <a:effectRef idx="0">
-            <a:schemeClr val="accent1"/>
-          </a:effectRef>
-          <a:fontRef idx="minor">
-            <a:schemeClr val="tx1"/>
-          </a:fontRef>
-        </p:style>
-      </p:cxnSp>
-      <p:cxnSp>
-        <p:nvCxnSpPr>
-          <p:cNvPr id="52" name="Conector reto 51"/>
-          <p:cNvCxnSpPr>
-            <a:endCxn id="13" idx="3"/>
-          </p:cNvCxnSpPr>
-          <p:nvPr/>
-        </p:nvCxnSpPr>
-        <p:spPr>
-          <a:xfrm>
-            <a:off x="10005641" y="2802420"/>
-            <a:ext cx="28912" cy="1358763"/>
           </a:xfrm>
           <a:prstGeom prst="line">
             <a:avLst/>
@@ -6411,7 +6106,7 @@
           <p:cNvPr id="2" name="Retângulo: Cantos Arredondados 1">
             <a:extLst>
               <a:ext uri="{FF2B5EF4-FFF2-40B4-BE49-F238E27FC236}">
-                <a16:creationId xmlns="" xmlns:a16="http://schemas.microsoft.com/office/drawing/2014/main" id="{71E86D7D-916F-498B-9151-1FC00881AA4A}"/>
+                <a16:creationId xmlns:a16="http://schemas.microsoft.com/office/drawing/2014/main" xmlns="" id="{71E86D7D-916F-498B-9151-1FC00881AA4A}"/>
               </a:ext>
             </a:extLst>
           </p:cNvPr>
@@ -6474,7 +6169,7 @@
           <p:cNvPr id="3" name="Conector reto 2">
             <a:extLst>
               <a:ext uri="{FF2B5EF4-FFF2-40B4-BE49-F238E27FC236}">
-                <a16:creationId xmlns="" xmlns:a16="http://schemas.microsoft.com/office/drawing/2014/main" id="{4212E35A-FE4C-44CD-B347-634311C873C1}"/>
+                <a16:creationId xmlns:a16="http://schemas.microsoft.com/office/drawing/2014/main" xmlns="" id="{4212E35A-FE4C-44CD-B347-634311C873C1}"/>
               </a:ext>
             </a:extLst>
           </p:cNvPr>
@@ -6512,7 +6207,7 @@
           <p:cNvPr id="4" name="Retângulo 3">
             <a:extLst>
               <a:ext uri="{FF2B5EF4-FFF2-40B4-BE49-F238E27FC236}">
-                <a16:creationId xmlns="" xmlns:a16="http://schemas.microsoft.com/office/drawing/2014/main" id="{A3F19016-7822-438C-9A2A-99580F97FBEA}"/>
+                <a16:creationId xmlns:a16="http://schemas.microsoft.com/office/drawing/2014/main" xmlns="" id="{A3F19016-7822-438C-9A2A-99580F97FBEA}"/>
               </a:ext>
             </a:extLst>
           </p:cNvPr>
@@ -6568,7 +6263,7 @@
           <p:cNvPr id="5" name="CaixaDeTexto 4">
             <a:extLst>
               <a:ext uri="{FF2B5EF4-FFF2-40B4-BE49-F238E27FC236}">
-                <a16:creationId xmlns="" xmlns:a16="http://schemas.microsoft.com/office/drawing/2014/main" id="{A88EB1D4-EA7B-4240-B245-D0093B79AE23}"/>
+                <a16:creationId xmlns:a16="http://schemas.microsoft.com/office/drawing/2014/main" xmlns="" id="{A88EB1D4-EA7B-4240-B245-D0093B79AE23}"/>
               </a:ext>
             </a:extLst>
           </p:cNvPr>
@@ -6605,7 +6300,7 @@
           <p:cNvPr id="7" name="Cubo 6">
             <a:extLst>
               <a:ext uri="{FF2B5EF4-FFF2-40B4-BE49-F238E27FC236}">
-                <a16:creationId xmlns="" xmlns:a16="http://schemas.microsoft.com/office/drawing/2014/main" id="{7CB94480-861D-47BC-8F39-38467A02CD1E}"/>
+                <a16:creationId xmlns:a16="http://schemas.microsoft.com/office/drawing/2014/main" xmlns="" id="{7CB94480-861D-47BC-8F39-38467A02CD1E}"/>
               </a:ext>
             </a:extLst>
           </p:cNvPr>
@@ -6680,7 +6375,7 @@
           <p:cNvPr id="8" name="Retângulo: Cantos Superiores Recortados 7">
             <a:extLst>
               <a:ext uri="{FF2B5EF4-FFF2-40B4-BE49-F238E27FC236}">
-                <a16:creationId xmlns="" xmlns:a16="http://schemas.microsoft.com/office/drawing/2014/main" id="{66ABF582-FC6C-4BC7-BEC3-0B92613B624C}"/>
+                <a16:creationId xmlns:a16="http://schemas.microsoft.com/office/drawing/2014/main" xmlns="" id="{66ABF582-FC6C-4BC7-BEC3-0B92613B624C}"/>
               </a:ext>
             </a:extLst>
           </p:cNvPr>
@@ -6716,10 +6411,9 @@
           <a:p>
             <a:pPr algn="ctr"/>
             <a:r>
-              <a:rPr lang="pt-BR" sz="1600" b="1" dirty="0" smtClean="0"/>
+              <a:rPr lang="pt-BR" sz="1600" b="1" dirty="0"/>
               <a:t>Vender produtos</a:t>
             </a:r>
-            <a:endParaRPr lang="pt-BR" sz="1600" b="1" dirty="0"/>
           </a:p>
         </p:txBody>
       </p:sp>
@@ -6728,7 +6422,7 @@
           <p:cNvPr id="10" name="Conector reto 9">
             <a:extLst>
               <a:ext uri="{FF2B5EF4-FFF2-40B4-BE49-F238E27FC236}">
-                <a16:creationId xmlns="" xmlns:a16="http://schemas.microsoft.com/office/drawing/2014/main" id="{4AF25932-ADA8-46C6-B2BA-860A0C6900F9}"/>
+                <a16:creationId xmlns:a16="http://schemas.microsoft.com/office/drawing/2014/main" xmlns="" id="{4AF25932-ADA8-46C6-B2BA-860A0C6900F9}"/>
               </a:ext>
             </a:extLst>
           </p:cNvPr>
@@ -6766,7 +6460,7 @@
           <p:cNvPr id="11" name="Título 1">
             <a:extLst>
               <a:ext uri="{FF2B5EF4-FFF2-40B4-BE49-F238E27FC236}">
-                <a16:creationId xmlns="" xmlns:a16="http://schemas.microsoft.com/office/drawing/2014/main" id="{411917F5-2B7E-47D6-8EB7-3137A1AF18C2}"/>
+                <a16:creationId xmlns:a16="http://schemas.microsoft.com/office/drawing/2014/main" xmlns="" id="{411917F5-2B7E-47D6-8EB7-3137A1AF18C2}"/>
               </a:ext>
             </a:extLst>
           </p:cNvPr>
@@ -6810,7 +6504,7 @@
           <a:p>
             <a:pPr algn="ctr"/>
             <a:r>
-              <a:rPr lang="pt-BR" sz="2800" b="1" dirty="0" smtClean="0">
+              <a:rPr lang="pt-BR" sz="2800" b="1" dirty="0">
                 <a:latin typeface="+mn-lt"/>
               </a:rPr>
               <a:t>Cenário: </a:t>
@@ -6863,7 +6557,7 @@
           <p:cNvPr id="2" name="Retângulo: Cantos Arredondados 1">
             <a:extLst>
               <a:ext uri="{FF2B5EF4-FFF2-40B4-BE49-F238E27FC236}">
-                <a16:creationId xmlns="" xmlns:a16="http://schemas.microsoft.com/office/drawing/2014/main" id="{71E86D7D-916F-498B-9151-1FC00881AA4A}"/>
+                <a16:creationId xmlns:a16="http://schemas.microsoft.com/office/drawing/2014/main" xmlns="" id="{71E86D7D-916F-498B-9151-1FC00881AA4A}"/>
               </a:ext>
             </a:extLst>
           </p:cNvPr>
@@ -6926,7 +6620,7 @@
           <p:cNvPr id="3" name="Conector reto 2">
             <a:extLst>
               <a:ext uri="{FF2B5EF4-FFF2-40B4-BE49-F238E27FC236}">
-                <a16:creationId xmlns="" xmlns:a16="http://schemas.microsoft.com/office/drawing/2014/main" id="{4212E35A-FE4C-44CD-B347-634311C873C1}"/>
+                <a16:creationId xmlns:a16="http://schemas.microsoft.com/office/drawing/2014/main" xmlns="" id="{4212E35A-FE4C-44CD-B347-634311C873C1}"/>
               </a:ext>
             </a:extLst>
           </p:cNvPr>
@@ -6964,7 +6658,7 @@
           <p:cNvPr id="4" name="Retângulo 3">
             <a:extLst>
               <a:ext uri="{FF2B5EF4-FFF2-40B4-BE49-F238E27FC236}">
-                <a16:creationId xmlns="" xmlns:a16="http://schemas.microsoft.com/office/drawing/2014/main" id="{A3F19016-7822-438C-9A2A-99580F97FBEA}"/>
+                <a16:creationId xmlns:a16="http://schemas.microsoft.com/office/drawing/2014/main" xmlns="" id="{A3F19016-7822-438C-9A2A-99580F97FBEA}"/>
               </a:ext>
             </a:extLst>
           </p:cNvPr>
@@ -7000,18 +6694,13 @@
           <a:p>
             <a:pPr algn="ctr"/>
             <a:r>
-              <a:rPr lang="pt-BR" sz="2500" b="1" dirty="0" smtClean="0">
+              <a:rPr lang="pt-BR" sz="2500" b="1" dirty="0">
                 <a:solidFill>
                   <a:schemeClr val="bg1"/>
                 </a:solidFill>
               </a:rPr>
               <a:t>Fornecedor</a:t>
             </a:r>
-            <a:endParaRPr lang="pt-BR" sz="2500" b="1" dirty="0">
-              <a:solidFill>
-                <a:schemeClr val="bg1"/>
-              </a:solidFill>
-            </a:endParaRPr>
           </a:p>
         </p:txBody>
       </p:sp>
@@ -7020,7 +6709,7 @@
           <p:cNvPr id="5" name="CaixaDeTexto 4">
             <a:extLst>
               <a:ext uri="{FF2B5EF4-FFF2-40B4-BE49-F238E27FC236}">
-                <a16:creationId xmlns="" xmlns:a16="http://schemas.microsoft.com/office/drawing/2014/main" id="{A88EB1D4-EA7B-4240-B245-D0093B79AE23}"/>
+                <a16:creationId xmlns:a16="http://schemas.microsoft.com/office/drawing/2014/main" xmlns="" id="{A88EB1D4-EA7B-4240-B245-D0093B79AE23}"/>
               </a:ext>
             </a:extLst>
           </p:cNvPr>
@@ -7057,7 +6746,7 @@
           <p:cNvPr id="7" name="Cubo 6">
             <a:extLst>
               <a:ext uri="{FF2B5EF4-FFF2-40B4-BE49-F238E27FC236}">
-                <a16:creationId xmlns="" xmlns:a16="http://schemas.microsoft.com/office/drawing/2014/main" id="{7CB94480-861D-47BC-8F39-38467A02CD1E}"/>
+                <a16:creationId xmlns:a16="http://schemas.microsoft.com/office/drawing/2014/main" xmlns="" id="{7CB94480-861D-47BC-8F39-38467A02CD1E}"/>
               </a:ext>
             </a:extLst>
           </p:cNvPr>
@@ -7093,7 +6782,7 @@
           <a:p>
             <a:pPr algn="ctr"/>
             <a:r>
-              <a:rPr lang="pt-BR" sz="1600" b="1" dirty="0" smtClean="0">
+              <a:rPr lang="pt-BR" sz="1600" b="1" dirty="0">
                 <a:solidFill>
                   <a:schemeClr val="tx1">
                     <a:lumMod val="95000"/>
@@ -7102,17 +6791,6 @@
                 </a:solidFill>
               </a:rPr>
               <a:t>Compras</a:t>
-            </a:r>
-            <a:r>
-              <a:rPr lang="pt-BR" sz="1600" b="1" dirty="0">
-                <a:solidFill>
-                  <a:schemeClr val="tx1">
-                    <a:lumMod val="95000"/>
-                    <a:lumOff val="5000"/>
-                  </a:schemeClr>
-                </a:solidFill>
-              </a:rPr>
-              <a:t/>
             </a:r>
             <a:br>
               <a:rPr lang="pt-BR" sz="1600" b="1" dirty="0">
@@ -7143,7 +6821,7 @@
           <p:cNvPr id="8" name="Retângulo: Cantos Superiores Recortados 7">
             <a:extLst>
               <a:ext uri="{FF2B5EF4-FFF2-40B4-BE49-F238E27FC236}">
-                <a16:creationId xmlns="" xmlns:a16="http://schemas.microsoft.com/office/drawing/2014/main" id="{66ABF582-FC6C-4BC7-BEC3-0B92613B624C}"/>
+                <a16:creationId xmlns:a16="http://schemas.microsoft.com/office/drawing/2014/main" xmlns="" id="{66ABF582-FC6C-4BC7-BEC3-0B92613B624C}"/>
               </a:ext>
             </a:extLst>
           </p:cNvPr>
@@ -7179,10 +6857,9 @@
           <a:p>
             <a:pPr algn="ctr"/>
             <a:r>
-              <a:rPr lang="pt-BR" sz="1600" b="1" dirty="0" smtClean="0"/>
+              <a:rPr lang="pt-BR" sz="1600" b="1" dirty="0"/>
               <a:t>Comprar produtos</a:t>
             </a:r>
-            <a:endParaRPr lang="pt-BR" sz="1600" b="1" dirty="0"/>
           </a:p>
         </p:txBody>
       </p:sp>
@@ -7191,7 +6868,7 @@
           <p:cNvPr id="10" name="Conector reto 9">
             <a:extLst>
               <a:ext uri="{FF2B5EF4-FFF2-40B4-BE49-F238E27FC236}">
-                <a16:creationId xmlns="" xmlns:a16="http://schemas.microsoft.com/office/drawing/2014/main" id="{4AF25932-ADA8-46C6-B2BA-860A0C6900F9}"/>
+                <a16:creationId xmlns:a16="http://schemas.microsoft.com/office/drawing/2014/main" xmlns="" id="{4AF25932-ADA8-46C6-B2BA-860A0C6900F9}"/>
               </a:ext>
             </a:extLst>
           </p:cNvPr>
@@ -7229,7 +6906,7 @@
           <p:cNvPr id="11" name="Título 1">
             <a:extLst>
               <a:ext uri="{FF2B5EF4-FFF2-40B4-BE49-F238E27FC236}">
-                <a16:creationId xmlns="" xmlns:a16="http://schemas.microsoft.com/office/drawing/2014/main" id="{411917F5-2B7E-47D6-8EB7-3137A1AF18C2}"/>
+                <a16:creationId xmlns:a16="http://schemas.microsoft.com/office/drawing/2014/main" xmlns="" id="{411917F5-2B7E-47D6-8EB7-3137A1AF18C2}"/>
               </a:ext>
             </a:extLst>
           </p:cNvPr>
@@ -7273,16 +6950,15 @@
           <a:p>
             <a:pPr algn="ctr"/>
             <a:r>
-              <a:rPr lang="pt-BR" sz="2800" b="1" dirty="0" smtClean="0">
+              <a:rPr lang="pt-BR" sz="2800" b="1" dirty="0">
                 <a:latin typeface="+mn-lt"/>
               </a:rPr>
               <a:t>Cenário: </a:t>
             </a:r>
             <a:r>
-              <a:rPr lang="pt-BR" sz="2800" dirty="0" smtClean="0"/>
+              <a:rPr lang="pt-BR" sz="2800" dirty="0"/>
               <a:t>Vender produtos</a:t>
             </a:r>
-            <a:endParaRPr lang="pt-BR" sz="2800" dirty="0"/>
           </a:p>
           <a:p>
             <a:pPr algn="ctr"/>
@@ -7292,6 +6968,57 @@
           </a:p>
         </p:txBody>
       </p:sp>
+      <mc:AlternateContent xmlns:mc="http://schemas.openxmlformats.org/markup-compatibility/2006" xmlns:p14="http://schemas.microsoft.com/office/powerpoint/2010/main">
+        <mc:Choice Requires="p14">
+          <p:contentPart p14:bwMode="auto" r:id="rId2">
+            <p14:nvContentPartPr>
+              <p14:cNvPr id="6" name="Tinta 5">
+                <a:extLst>
+                  <a:ext uri="{FF2B5EF4-FFF2-40B4-BE49-F238E27FC236}">
+                    <a16:creationId xmlns:a16="http://schemas.microsoft.com/office/drawing/2014/main" xmlns="" id="{6AEB5FE6-FB39-4F8B-A5DF-94E3DBA96C85}"/>
+                  </a:ext>
+                </a:extLst>
+              </p14:cNvPr>
+              <p14:cNvContentPartPr/>
+              <p14:nvPr/>
+            </p14:nvContentPartPr>
+            <p14:xfrm>
+              <a:off x="2968401" y="4904350"/>
+              <a:ext cx="360" cy="360"/>
+            </p14:xfrm>
+          </p:contentPart>
+        </mc:Choice>
+        <mc:Fallback xmlns="">
+          <p:pic>
+            <p:nvPicPr>
+              <p:cNvPr id="6" name="Tinta 5">
+                <a:extLst>
+                  <a:ext uri="{FF2B5EF4-FFF2-40B4-BE49-F238E27FC236}">
+                    <a16:creationId xmlns:a16="http://schemas.microsoft.com/office/drawing/2014/main" id="{6AEB5FE6-FB39-4F8B-A5DF-94E3DBA96C85}"/>
+                  </a:ext>
+                </a:extLst>
+              </p:cNvPr>
+              <p:cNvPicPr/>
+              <p:nvPr/>
+            </p:nvPicPr>
+            <p:blipFill>
+              <a:blip r:embed="rId3"/>
+              <a:stretch>
+                <a:fillRect/>
+              </a:stretch>
+            </p:blipFill>
+            <p:spPr>
+              <a:xfrm>
+                <a:off x="2959401" y="4895350"/>
+                <a:ext cx="18000" cy="18000"/>
+              </a:xfrm>
+              <a:prstGeom prst="rect">
+                <a:avLst/>
+              </a:prstGeom>
+            </p:spPr>
+          </p:pic>
+        </mc:Fallback>
+      </mc:AlternateContent>
     </p:spTree>
     <p:extLst>
       <p:ext uri="{BB962C8B-B14F-4D97-AF65-F5344CB8AC3E}">

</xml_diff>

<commit_message>
Update 15 e 16
</commit_message>
<xml_diff>
--- a/artefatos/15. Arquitetura de Negócio para cada Cenário.pptx
+++ b/artefatos/15. Arquitetura de Negócio para cada Cenário.pptx
@@ -11,8 +11,6 @@
     <p:sldId id="259" r:id="rId5"/>
     <p:sldId id="260" r:id="rId6"/>
     <p:sldId id="261" r:id="rId7"/>
-    <p:sldId id="262" r:id="rId8"/>
-    <p:sldId id="264" r:id="rId9"/>
   </p:sldIdLst>
   <p:sldSz cx="12192000" cy="6858000"/>
   <p:notesSz cx="6858000" cy="9144000"/>
@@ -119,33 +117,6 @@
 </p:presentation>
 </file>
 
-<file path=ppt/ink/ink1.xml><?xml version="1.0" encoding="utf-8"?>
-<inkml:ink xmlns:inkml="http://www.w3.org/2003/InkML">
-  <inkml:definitions>
-    <inkml:context xml:id="ctx0">
-      <inkml:inkSource xml:id="inkSrc0">
-        <inkml:traceFormat>
-          <inkml:channel name="X" type="integer" min="-2.14748E9" max="2.14748E9" units="cm"/>
-          <inkml:channel name="Y" type="integer" min="-2.14748E9" max="2.14748E9" units="cm"/>
-        </inkml:traceFormat>
-        <inkml:channelProperties>
-          <inkml:channelProperty channel="X" name="resolution" value="1000" units="1/cm"/>
-          <inkml:channelProperty channel="Y" name="resolution" value="1000" units="1/cm"/>
-        </inkml:channelProperties>
-      </inkml:inkSource>
-      <inkml:timestamp xml:id="ts0" timeString="2021-05-24T12:55:08.182"/>
-    </inkml:context>
-    <inkml:brush xml:id="br0">
-      <inkml:brushProperty name="width" value="0.05" units="cm"/>
-      <inkml:brushProperty name="height" value="0.05" units="cm"/>
-      <inkml:brushProperty name="color" value="#FF0066"/>
-      <inkml:brushProperty name="ignorePressure" value="1"/>
-    </inkml:brush>
-  </inkml:definitions>
-  <inkml:trace contextRef="#ctx0" brushRef="#br0">0 0,'0'0</inkml:trace>
-</inkml:ink>
-</file>
-
 <file path=ppt/slideLayouts/slideLayout1.xml><?xml version="1.0" encoding="utf-8"?>
 <p:sldLayout xmlns:a="http://schemas.openxmlformats.org/drawingml/2006/main" xmlns:r="http://schemas.openxmlformats.org/officeDocument/2006/relationships" xmlns:p="http://schemas.openxmlformats.org/presentationml/2006/main" type="title" preserve="1">
   <p:cSld name="Slide de Título">
@@ -293,7 +264,7 @@
           <a:p>
             <a:fld id="{8534D01F-854E-4A4D-8288-8E2FDA9CA879}" type="datetimeFigureOut">
               <a:rPr lang="pt-BR" smtClean="0"/>
-              <a:t>27/05/2021</a:t>
+              <a:t>01/06/2021</a:t>
             </a:fld>
             <a:endParaRPr lang="pt-BR"/>
           </a:p>
@@ -491,7 +462,7 @@
           <a:p>
             <a:fld id="{8534D01F-854E-4A4D-8288-8E2FDA9CA879}" type="datetimeFigureOut">
               <a:rPr lang="pt-BR" smtClean="0"/>
-              <a:t>27/05/2021</a:t>
+              <a:t>01/06/2021</a:t>
             </a:fld>
             <a:endParaRPr lang="pt-BR"/>
           </a:p>
@@ -699,7 +670,7 @@
           <a:p>
             <a:fld id="{8534D01F-854E-4A4D-8288-8E2FDA9CA879}" type="datetimeFigureOut">
               <a:rPr lang="pt-BR" smtClean="0"/>
-              <a:t>27/05/2021</a:t>
+              <a:t>01/06/2021</a:t>
             </a:fld>
             <a:endParaRPr lang="pt-BR"/>
           </a:p>
@@ -897,7 +868,7 @@
           <a:p>
             <a:fld id="{8534D01F-854E-4A4D-8288-8E2FDA9CA879}" type="datetimeFigureOut">
               <a:rPr lang="pt-BR" smtClean="0"/>
-              <a:t>27/05/2021</a:t>
+              <a:t>01/06/2021</a:t>
             </a:fld>
             <a:endParaRPr lang="pt-BR"/>
           </a:p>
@@ -1172,7 +1143,7 @@
           <a:p>
             <a:fld id="{8534D01F-854E-4A4D-8288-8E2FDA9CA879}" type="datetimeFigureOut">
               <a:rPr lang="pt-BR" smtClean="0"/>
-              <a:t>27/05/2021</a:t>
+              <a:t>01/06/2021</a:t>
             </a:fld>
             <a:endParaRPr lang="pt-BR"/>
           </a:p>
@@ -1437,7 +1408,7 @@
           <a:p>
             <a:fld id="{8534D01F-854E-4A4D-8288-8E2FDA9CA879}" type="datetimeFigureOut">
               <a:rPr lang="pt-BR" smtClean="0"/>
-              <a:t>27/05/2021</a:t>
+              <a:t>01/06/2021</a:t>
             </a:fld>
             <a:endParaRPr lang="pt-BR"/>
           </a:p>
@@ -1849,7 +1820,7 @@
           <a:p>
             <a:fld id="{8534D01F-854E-4A4D-8288-8E2FDA9CA879}" type="datetimeFigureOut">
               <a:rPr lang="pt-BR" smtClean="0"/>
-              <a:t>27/05/2021</a:t>
+              <a:t>01/06/2021</a:t>
             </a:fld>
             <a:endParaRPr lang="pt-BR"/>
           </a:p>
@@ -1990,7 +1961,7 @@
           <a:p>
             <a:fld id="{8534D01F-854E-4A4D-8288-8E2FDA9CA879}" type="datetimeFigureOut">
               <a:rPr lang="pt-BR" smtClean="0"/>
-              <a:t>27/05/2021</a:t>
+              <a:t>01/06/2021</a:t>
             </a:fld>
             <a:endParaRPr lang="pt-BR"/>
           </a:p>
@@ -2103,7 +2074,7 @@
           <a:p>
             <a:fld id="{8534D01F-854E-4A4D-8288-8E2FDA9CA879}" type="datetimeFigureOut">
               <a:rPr lang="pt-BR" smtClean="0"/>
-              <a:t>27/05/2021</a:t>
+              <a:t>01/06/2021</a:t>
             </a:fld>
             <a:endParaRPr lang="pt-BR"/>
           </a:p>
@@ -2414,7 +2385,7 @@
           <a:p>
             <a:fld id="{8534D01F-854E-4A4D-8288-8E2FDA9CA879}" type="datetimeFigureOut">
               <a:rPr lang="pt-BR" smtClean="0"/>
-              <a:t>27/05/2021</a:t>
+              <a:t>01/06/2021</a:t>
             </a:fld>
             <a:endParaRPr lang="pt-BR"/>
           </a:p>
@@ -2702,7 +2673,7 @@
           <a:p>
             <a:fld id="{8534D01F-854E-4A4D-8288-8E2FDA9CA879}" type="datetimeFigureOut">
               <a:rPr lang="pt-BR" smtClean="0"/>
-              <a:t>27/05/2021</a:t>
+              <a:t>01/06/2021</a:t>
             </a:fld>
             <a:endParaRPr lang="pt-BR"/>
           </a:p>
@@ -2943,7 +2914,7 @@
           <a:p>
             <a:fld id="{8534D01F-854E-4A4D-8288-8E2FDA9CA879}" type="datetimeFigureOut">
               <a:rPr lang="pt-BR" smtClean="0"/>
-              <a:t>27/05/2021</a:t>
+              <a:t>01/06/2021</a:t>
             </a:fld>
             <a:endParaRPr lang="pt-BR"/>
           </a:p>
@@ -3725,7 +3696,7 @@
         </p:nvSpPr>
         <p:spPr>
           <a:xfrm>
-            <a:off x="6944139" y="606913"/>
+            <a:off x="7033590" y="1553863"/>
             <a:ext cx="3047999" cy="3294527"/>
           </a:xfrm>
           <a:prstGeom prst="roundRect">
@@ -3788,7 +3759,7 @@
         </p:nvSpPr>
         <p:spPr>
           <a:xfrm>
-            <a:off x="6854684" y="711777"/>
+            <a:off x="6944136" y="1037672"/>
             <a:ext cx="3226905" cy="461665"/>
           </a:xfrm>
           <a:prstGeom prst="rect">
@@ -3829,7 +3800,7 @@
         </p:nvSpPr>
         <p:spPr>
           <a:xfrm>
-            <a:off x="1929444" y="1173442"/>
+            <a:off x="2018895" y="2120392"/>
             <a:ext cx="1621063" cy="1626165"/>
           </a:xfrm>
           <a:prstGeom prst="rect">
@@ -3885,7 +3856,7 @@
         </p:nvSpPr>
         <p:spPr>
           <a:xfrm>
-            <a:off x="3558877" y="911111"/>
+            <a:off x="3707294" y="2120299"/>
             <a:ext cx="3326296" cy="338554"/>
           </a:xfrm>
           <a:prstGeom prst="rect">
@@ -3903,62 +3874,6 @@
               <a:rPr lang="pt-BR" sz="1600" dirty="0"/>
               <a:t>1. Obter agendamento</a:t>
             </a:r>
-          </a:p>
-        </p:txBody>
-      </p:sp>
-      <p:sp>
-        <p:nvSpPr>
-          <p:cNvPr id="10" name="Retângulo 9">
-            <a:extLst>
-              <a:ext uri="{FF2B5EF4-FFF2-40B4-BE49-F238E27FC236}">
-                <a16:creationId xmlns:a16="http://schemas.microsoft.com/office/drawing/2014/main" xmlns="" id="{6148B80D-94EB-4BB4-ADD8-2729C8C1D8A7}"/>
-              </a:ext>
-            </a:extLst>
-          </p:cNvPr>
-          <p:cNvSpPr/>
-          <p:nvPr/>
-        </p:nvSpPr>
-        <p:spPr>
-          <a:xfrm>
-            <a:off x="7522000" y="4532372"/>
-            <a:ext cx="1907512" cy="1587662"/>
-          </a:xfrm>
-          <a:prstGeom prst="rect">
-            <a:avLst/>
-          </a:prstGeom>
-        </p:spPr>
-        <p:style>
-          <a:lnRef idx="1">
-            <a:schemeClr val="dk1"/>
-          </a:lnRef>
-          <a:fillRef idx="2">
-            <a:schemeClr val="dk1"/>
-          </a:fillRef>
-          <a:effectRef idx="1">
-            <a:schemeClr val="dk1"/>
-          </a:effectRef>
-          <a:fontRef idx="minor">
-            <a:schemeClr val="dk1"/>
-          </a:fontRef>
-        </p:style>
-        <p:txBody>
-          <a:bodyPr rtlCol="0" anchor="ctr"/>
-          <a:lstStyle/>
-          <a:p>
-            <a:pPr algn="ctr"/>
-            <a:r>
-              <a:rPr lang="pt-BR" sz="2800" b="1" dirty="0">
-                <a:solidFill>
-                  <a:schemeClr val="bg1"/>
-                </a:solidFill>
-              </a:rPr>
-              <a:t>Fornecedor</a:t>
-            </a:r>
-            <a:endParaRPr lang="pt-BR" b="1" dirty="0">
-              <a:solidFill>
-                <a:schemeClr val="bg1"/>
-              </a:solidFill>
-            </a:endParaRPr>
           </a:p>
         </p:txBody>
       </p:sp>
@@ -3970,7 +3885,7 @@
         </p:nvCxnSpPr>
         <p:spPr>
           <a:xfrm flipV="1">
-            <a:off x="3561566" y="1986524"/>
+            <a:off x="3651017" y="2933474"/>
             <a:ext cx="3382573" cy="19114"/>
           </a:xfrm>
           <a:prstGeom prst="line">
@@ -4007,7 +3922,7 @@
         </p:nvSpPr>
         <p:spPr>
           <a:xfrm>
-            <a:off x="3567247" y="1143954"/>
+            <a:off x="3715664" y="2353142"/>
             <a:ext cx="3326296" cy="338554"/>
           </a:xfrm>
           <a:prstGeom prst="rect">
@@ -4042,7 +3957,7 @@
         </p:nvSpPr>
         <p:spPr>
           <a:xfrm>
-            <a:off x="3567247" y="1385732"/>
+            <a:off x="3715664" y="2594920"/>
             <a:ext cx="3326296" cy="338554"/>
           </a:xfrm>
           <a:prstGeom prst="rect">
@@ -4059,114 +3974,6 @@
             <a:r>
               <a:rPr lang="pt-BR" sz="1600" dirty="0"/>
               <a:t>3. Receber serviços de beleza</a:t>
-            </a:r>
-          </a:p>
-        </p:txBody>
-      </p:sp>
-      <p:sp>
-        <p:nvSpPr>
-          <p:cNvPr id="15" name="CaixaDeTexto 14">
-            <a:extLst>
-              <a:ext uri="{FF2B5EF4-FFF2-40B4-BE49-F238E27FC236}">
-                <a16:creationId xmlns:a16="http://schemas.microsoft.com/office/drawing/2014/main" xmlns="" id="{49353DD0-8323-48AF-9FBB-2D99D9ECEA22}"/>
-              </a:ext>
-            </a:extLst>
-          </p:cNvPr>
-          <p:cNvSpPr txBox="1"/>
-          <p:nvPr/>
-        </p:nvSpPr>
-        <p:spPr>
-          <a:xfrm>
-            <a:off x="3567247" y="1638437"/>
-            <a:ext cx="3326296" cy="338554"/>
-          </a:xfrm>
-          <a:prstGeom prst="rect">
-            <a:avLst/>
-          </a:prstGeom>
-          <a:noFill/>
-        </p:spPr>
-        <p:txBody>
-          <a:bodyPr wrap="square" rtlCol="0">
-            <a:spAutoFit/>
-          </a:bodyPr>
-          <a:lstStyle/>
-          <a:p>
-            <a:r>
-              <a:rPr lang="pt-BR" sz="1600" dirty="0"/>
-              <a:t>4. Comprar produtos</a:t>
-            </a:r>
-          </a:p>
-        </p:txBody>
-      </p:sp>
-      <p:cxnSp>
-        <p:nvCxnSpPr>
-          <p:cNvPr id="17" name="Conector reto 16"/>
-          <p:cNvCxnSpPr>
-            <a:stCxn id="5" idx="2"/>
-            <a:endCxn id="10" idx="0"/>
-          </p:cNvCxnSpPr>
-          <p:nvPr/>
-        </p:nvCxnSpPr>
-        <p:spPr>
-          <a:xfrm>
-            <a:off x="8468139" y="3901440"/>
-            <a:ext cx="7617" cy="630932"/>
-          </a:xfrm>
-          <a:prstGeom prst="line">
-            <a:avLst/>
-          </a:prstGeom>
-          <a:ln w="12700">
-            <a:solidFill>
-              <a:schemeClr val="tx1"/>
-            </a:solidFill>
-          </a:ln>
-        </p:spPr>
-        <p:style>
-          <a:lnRef idx="1">
-            <a:schemeClr val="accent1"/>
-          </a:lnRef>
-          <a:fillRef idx="0">
-            <a:schemeClr val="accent1"/>
-          </a:fillRef>
-          <a:effectRef idx="0">
-            <a:schemeClr val="accent1"/>
-          </a:effectRef>
-          <a:fontRef idx="minor">
-            <a:schemeClr val="tx1"/>
-          </a:fontRef>
-        </p:style>
-      </p:cxnSp>
-      <p:sp>
-        <p:nvSpPr>
-          <p:cNvPr id="18" name="CaixaDeTexto 17">
-            <a:extLst>
-              <a:ext uri="{FF2B5EF4-FFF2-40B4-BE49-F238E27FC236}">
-                <a16:creationId xmlns:a16="http://schemas.microsoft.com/office/drawing/2014/main" xmlns="" id="{49353DD0-8323-48AF-9FBB-2D99D9ECEA22}"/>
-              </a:ext>
-            </a:extLst>
-          </p:cNvPr>
-          <p:cNvSpPr txBox="1"/>
-          <p:nvPr/>
-        </p:nvSpPr>
-        <p:spPr>
-          <a:xfrm>
-            <a:off x="8475756" y="4022969"/>
-            <a:ext cx="3326296" cy="338554"/>
-          </a:xfrm>
-          <a:prstGeom prst="rect">
-            <a:avLst/>
-          </a:prstGeom>
-          <a:noFill/>
-        </p:spPr>
-        <p:txBody>
-          <a:bodyPr wrap="square" rtlCol="0">
-            <a:spAutoFit/>
-          </a:bodyPr>
-          <a:lstStyle/>
-          <a:p>
-            <a:r>
-              <a:rPr lang="pt-BR" sz="1600" dirty="0"/>
-              <a:t>5. Vender produtos</a:t>
             </a:r>
           </a:p>
         </p:txBody>
@@ -5494,7 +5301,7 @@
         </p:nvSpPr>
         <p:spPr>
           <a:xfrm>
-            <a:off x="5295601" y="2022888"/>
+            <a:off x="5190944" y="2031930"/>
             <a:ext cx="1323923" cy="808382"/>
           </a:xfrm>
           <a:prstGeom prst="cube">
@@ -5615,7 +5422,7 @@
         </p:nvSpPr>
         <p:spPr>
           <a:xfrm>
-            <a:off x="8610008" y="4161183"/>
+            <a:off x="8029351" y="4199075"/>
             <a:ext cx="1309274" cy="808382"/>
           </a:xfrm>
           <a:prstGeom prst="snip2SameRect">
@@ -5662,7 +5469,7 @@
         </p:nvSpPr>
         <p:spPr>
           <a:xfrm>
-            <a:off x="7076544" y="4168701"/>
+            <a:off x="6689129" y="4199075"/>
             <a:ext cx="1095376" cy="808382"/>
           </a:xfrm>
           <a:prstGeom prst="snip2SameRect">
@@ -5709,7 +5516,7 @@
         </p:nvSpPr>
         <p:spPr>
           <a:xfrm>
-            <a:off x="7076544" y="2016496"/>
+            <a:off x="6674194" y="1984513"/>
             <a:ext cx="1203774" cy="808382"/>
           </a:xfrm>
           <a:prstGeom prst="cube">
@@ -5763,7 +5570,7 @@
         </p:nvSpPr>
         <p:spPr>
           <a:xfrm>
-            <a:off x="8676716" y="1984513"/>
+            <a:off x="8139875" y="1984513"/>
             <a:ext cx="1256524" cy="808382"/>
           </a:xfrm>
           <a:prstGeom prst="cube">
@@ -5805,7 +5612,7 @@
       </p:sp>
       <p:sp>
         <p:nvSpPr>
-          <p:cNvPr id="23" name="Retângulo: Cantos Superiores Recortados 7">
+          <p:cNvPr id="16" name="Retângulo: Cantos Superiores Recortados 7">
             <a:extLst>
               <a:ext uri="{FF2B5EF4-FFF2-40B4-BE49-F238E27FC236}">
                 <a16:creationId xmlns:a16="http://schemas.microsoft.com/office/drawing/2014/main" xmlns="" id="{66ABF582-FC6C-4BC7-BEC3-0B92613B624C}"/>
@@ -5817,7 +5624,7 @@
         </p:nvSpPr>
         <p:spPr>
           <a:xfrm>
-            <a:off x="4311222" y="4150075"/>
+            <a:off x="5166381" y="4199075"/>
             <a:ext cx="1170953" cy="808382"/>
           </a:xfrm>
           <a:prstGeom prst="snip2SameRect">
@@ -5845,104 +5652,22 @@
             <a:pPr algn="ctr"/>
             <a:r>
               <a:rPr lang="pt-BR" sz="1200" b="1" dirty="0"/>
-              <a:t>Finalizar Serviço</a:t>
+              <a:t>Recepcionar Cliente</a:t>
             </a:r>
           </a:p>
         </p:txBody>
       </p:sp>
       <p:cxnSp>
         <p:nvCxnSpPr>
-          <p:cNvPr id="39" name="Conector reto 38"/>
+          <p:cNvPr id="43" name="Conector reto 42"/>
           <p:cNvCxnSpPr>
-            <a:endCxn id="23" idx="3"/>
+            <a:stCxn id="7" idx="3"/>
           </p:cNvCxnSpPr>
           <p:nvPr/>
         </p:nvCxnSpPr>
         <p:spPr>
           <a:xfrm flipH="1">
-            <a:off x="4896699" y="2839303"/>
-            <a:ext cx="503992" cy="1310772"/>
-          </a:xfrm>
-          <a:prstGeom prst="line">
-            <a:avLst/>
-          </a:prstGeom>
-          <a:ln>
-            <a:solidFill>
-              <a:schemeClr val="tx1"/>
-            </a:solidFill>
-          </a:ln>
-        </p:spPr>
-        <p:style>
-          <a:lnRef idx="1">
-            <a:schemeClr val="accent1"/>
-          </a:lnRef>
-          <a:fillRef idx="0">
-            <a:schemeClr val="accent1"/>
-          </a:fillRef>
-          <a:effectRef idx="0">
-            <a:schemeClr val="accent1"/>
-          </a:effectRef>
-          <a:fontRef idx="minor">
-            <a:schemeClr val="tx1"/>
-          </a:fontRef>
-        </p:style>
-      </p:cxnSp>
-      <p:sp>
-        <p:nvSpPr>
-          <p:cNvPr id="16" name="Retângulo: Cantos Superiores Recortados 7">
-            <a:extLst>
-              <a:ext uri="{FF2B5EF4-FFF2-40B4-BE49-F238E27FC236}">
-                <a16:creationId xmlns:a16="http://schemas.microsoft.com/office/drawing/2014/main" xmlns="" id="{66ABF582-FC6C-4BC7-BEC3-0B92613B624C}"/>
-              </a:ext>
-            </a:extLst>
-          </p:cNvPr>
-          <p:cNvSpPr/>
-          <p:nvPr/>
-        </p:nvSpPr>
-        <p:spPr>
-          <a:xfrm>
-            <a:off x="5686547" y="4183641"/>
-            <a:ext cx="1170953" cy="808382"/>
-          </a:xfrm>
-          <a:prstGeom prst="snip2SameRect">
-            <a:avLst/>
-          </a:prstGeom>
-        </p:spPr>
-        <p:style>
-          <a:lnRef idx="1">
-            <a:schemeClr val="dk1"/>
-          </a:lnRef>
-          <a:fillRef idx="3">
-            <a:schemeClr val="dk1"/>
-          </a:fillRef>
-          <a:effectRef idx="2">
-            <a:schemeClr val="dk1"/>
-          </a:effectRef>
-          <a:fontRef idx="minor">
-            <a:schemeClr val="lt1"/>
-          </a:fontRef>
-        </p:style>
-        <p:txBody>
-          <a:bodyPr rtlCol="0" anchor="ctr"/>
-          <a:lstStyle/>
-          <a:p>
-            <a:pPr algn="ctr"/>
-            <a:r>
-              <a:rPr lang="pt-BR" sz="1200" b="1" dirty="0"/>
-              <a:t>Recepcionar Cliente</a:t>
-            </a:r>
-          </a:p>
-        </p:txBody>
-      </p:sp>
-      <p:cxnSp>
-        <p:nvCxnSpPr>
-          <p:cNvPr id="43" name="Conector reto 42"/>
-          <p:cNvCxnSpPr/>
-          <p:nvPr/>
-        </p:nvCxnSpPr>
-        <p:spPr>
-          <a:xfrm flipH="1">
-            <a:off x="6297408" y="2831270"/>
+            <a:off x="5742344" y="2840312"/>
             <a:ext cx="9514" cy="1358763"/>
           </a:xfrm>
           <a:prstGeom prst="line">
@@ -5972,13 +5697,16 @@
       <p:cxnSp>
         <p:nvCxnSpPr>
           <p:cNvPr id="46" name="Conector reto 45"/>
-          <p:cNvCxnSpPr/>
+          <p:cNvCxnSpPr>
+            <a:cxnSpLocks/>
+            <a:endCxn id="15" idx="3"/>
+          </p:cNvCxnSpPr>
           <p:nvPr/>
         </p:nvCxnSpPr>
         <p:spPr>
           <a:xfrm>
-            <a:off x="7624232" y="2824878"/>
-            <a:ext cx="0" cy="1358763"/>
+            <a:off x="7236817" y="2802420"/>
+            <a:ext cx="0" cy="1396655"/>
           </a:xfrm>
           <a:prstGeom prst="line">
             <a:avLst/>
@@ -6038,14 +5766,16 @@
         <p:nvCxnSpPr>
           <p:cNvPr id="50" name="Conector reto 49"/>
           <p:cNvCxnSpPr>
+            <a:cxnSpLocks/>
             <a:stCxn id="18" idx="3"/>
+            <a:endCxn id="14" idx="3"/>
           </p:cNvCxnSpPr>
           <p:nvPr/>
         </p:nvCxnSpPr>
         <p:spPr>
           <a:xfrm>
-            <a:off x="9203930" y="2792895"/>
-            <a:ext cx="7360" cy="1368288"/>
+            <a:off x="8667089" y="2792895"/>
+            <a:ext cx="16899" cy="1406180"/>
           </a:xfrm>
           <a:prstGeom prst="line">
             <a:avLst/>
@@ -6075,954 +5805,6 @@
     <p:extLst>
       <p:ext uri="{BB962C8B-B14F-4D97-AF65-F5344CB8AC3E}">
         <p14:creationId xmlns:p14="http://schemas.microsoft.com/office/powerpoint/2010/main" val="2233674139"/>
-      </p:ext>
-    </p:extLst>
-  </p:cSld>
-  <p:clrMapOvr>
-    <a:masterClrMapping/>
-  </p:clrMapOvr>
-</p:sld>
-</file>
-
-<file path=ppt/slides/slide7.xml><?xml version="1.0" encoding="utf-8"?>
-<p:sld xmlns:a="http://schemas.openxmlformats.org/drawingml/2006/main" xmlns:r="http://schemas.openxmlformats.org/officeDocument/2006/relationships" xmlns:p="http://schemas.openxmlformats.org/presentationml/2006/main">
-  <p:cSld>
-    <p:spTree>
-      <p:nvGrpSpPr>
-        <p:cNvPr id="1" name=""/>
-        <p:cNvGrpSpPr/>
-        <p:nvPr/>
-      </p:nvGrpSpPr>
-      <p:grpSpPr>
-        <a:xfrm>
-          <a:off x="0" y="0"/>
-          <a:ext cx="0" cy="0"/>
-          <a:chOff x="0" y="0"/>
-          <a:chExt cx="0" cy="0"/>
-        </a:xfrm>
-      </p:grpSpPr>
-      <p:sp>
-        <p:nvSpPr>
-          <p:cNvPr id="2" name="Retângulo: Cantos Arredondados 1">
-            <a:extLst>
-              <a:ext uri="{FF2B5EF4-FFF2-40B4-BE49-F238E27FC236}">
-                <a16:creationId xmlns:a16="http://schemas.microsoft.com/office/drawing/2014/main" xmlns="" id="{71E86D7D-916F-498B-9151-1FC00881AA4A}"/>
-              </a:ext>
-            </a:extLst>
-          </p:cNvPr>
-          <p:cNvSpPr/>
-          <p:nvPr/>
-        </p:nvSpPr>
-        <p:spPr>
-          <a:xfrm>
-            <a:off x="6904383" y="1262269"/>
-            <a:ext cx="4333461" cy="4333461"/>
-          </a:xfrm>
-          <a:prstGeom prst="roundRect">
-            <a:avLst/>
-          </a:prstGeom>
-          <a:solidFill>
-            <a:schemeClr val="bg1">
-              <a:lumMod val="95000"/>
-            </a:schemeClr>
-          </a:solidFill>
-          <a:ln>
-            <a:solidFill>
-              <a:schemeClr val="tx1"/>
-            </a:solidFill>
-          </a:ln>
-        </p:spPr>
-        <p:style>
-          <a:lnRef idx="2">
-            <a:schemeClr val="accent1">
-              <a:shade val="50000"/>
-            </a:schemeClr>
-          </a:lnRef>
-          <a:fillRef idx="1">
-            <a:schemeClr val="accent1"/>
-          </a:fillRef>
-          <a:effectRef idx="0">
-            <a:schemeClr val="accent1"/>
-          </a:effectRef>
-          <a:fontRef idx="minor">
-            <a:schemeClr val="lt1"/>
-          </a:fontRef>
-        </p:style>
-        <p:txBody>
-          <a:bodyPr rtlCol="0" anchor="ctr"/>
-          <a:lstStyle/>
-          <a:p>
-            <a:pPr algn="ctr"/>
-            <a:endParaRPr lang="pt-BR" sz="2800" b="1" dirty="0">
-              <a:solidFill>
-                <a:schemeClr val="tx1">
-                  <a:lumMod val="95000"/>
-                  <a:lumOff val="5000"/>
-                </a:schemeClr>
-              </a:solidFill>
-            </a:endParaRPr>
-          </a:p>
-        </p:txBody>
-      </p:sp>
-      <p:cxnSp>
-        <p:nvCxnSpPr>
-          <p:cNvPr id="3" name="Conector reto 2">
-            <a:extLst>
-              <a:ext uri="{FF2B5EF4-FFF2-40B4-BE49-F238E27FC236}">
-                <a16:creationId xmlns:a16="http://schemas.microsoft.com/office/drawing/2014/main" xmlns="" id="{4212E35A-FE4C-44CD-B347-634311C873C1}"/>
-              </a:ext>
-            </a:extLst>
-          </p:cNvPr>
-          <p:cNvCxnSpPr>
-            <a:stCxn id="2" idx="1"/>
-          </p:cNvCxnSpPr>
-          <p:nvPr/>
-        </p:nvCxnSpPr>
-        <p:spPr>
-          <a:xfrm flipH="1" flipV="1">
-            <a:off x="3578087" y="3428999"/>
-            <a:ext cx="3326296" cy="1"/>
-          </a:xfrm>
-          <a:prstGeom prst="line">
-            <a:avLst/>
-          </a:prstGeom>
-        </p:spPr>
-        <p:style>
-          <a:lnRef idx="1">
-            <a:schemeClr val="dk1"/>
-          </a:lnRef>
-          <a:fillRef idx="0">
-            <a:schemeClr val="dk1"/>
-          </a:fillRef>
-          <a:effectRef idx="0">
-            <a:schemeClr val="dk1"/>
-          </a:effectRef>
-          <a:fontRef idx="minor">
-            <a:schemeClr val="tx1"/>
-          </a:fontRef>
-        </p:style>
-      </p:cxnSp>
-      <p:sp>
-        <p:nvSpPr>
-          <p:cNvPr id="4" name="Retângulo 3">
-            <a:extLst>
-              <a:ext uri="{FF2B5EF4-FFF2-40B4-BE49-F238E27FC236}">
-                <a16:creationId xmlns:a16="http://schemas.microsoft.com/office/drawing/2014/main" xmlns="" id="{A3F19016-7822-438C-9A2A-99580F97FBEA}"/>
-              </a:ext>
-            </a:extLst>
-          </p:cNvPr>
-          <p:cNvSpPr/>
-          <p:nvPr/>
-        </p:nvSpPr>
-        <p:spPr>
-          <a:xfrm>
-            <a:off x="1855304" y="2547729"/>
-            <a:ext cx="1762539" cy="1762539"/>
-          </a:xfrm>
-          <a:prstGeom prst="rect">
-            <a:avLst/>
-          </a:prstGeom>
-        </p:spPr>
-        <p:style>
-          <a:lnRef idx="1">
-            <a:schemeClr val="dk1"/>
-          </a:lnRef>
-          <a:fillRef idx="2">
-            <a:schemeClr val="dk1"/>
-          </a:fillRef>
-          <a:effectRef idx="1">
-            <a:schemeClr val="dk1"/>
-          </a:effectRef>
-          <a:fontRef idx="minor">
-            <a:schemeClr val="dk1"/>
-          </a:fontRef>
-        </p:style>
-        <p:txBody>
-          <a:bodyPr rtlCol="0" anchor="ctr"/>
-          <a:lstStyle/>
-          <a:p>
-            <a:pPr algn="ctr"/>
-            <a:r>
-              <a:rPr lang="pt-BR" sz="2800" b="1" dirty="0">
-                <a:solidFill>
-                  <a:schemeClr val="bg1"/>
-                </a:solidFill>
-              </a:rPr>
-              <a:t>Cliente</a:t>
-            </a:r>
-            <a:endParaRPr lang="pt-BR" b="1" dirty="0">
-              <a:solidFill>
-                <a:schemeClr val="bg1"/>
-              </a:solidFill>
-            </a:endParaRPr>
-          </a:p>
-        </p:txBody>
-      </p:sp>
-      <p:sp>
-        <p:nvSpPr>
-          <p:cNvPr id="5" name="CaixaDeTexto 4">
-            <a:extLst>
-              <a:ext uri="{FF2B5EF4-FFF2-40B4-BE49-F238E27FC236}">
-                <a16:creationId xmlns:a16="http://schemas.microsoft.com/office/drawing/2014/main" xmlns="" id="{A88EB1D4-EA7B-4240-B245-D0093B79AE23}"/>
-              </a:ext>
-            </a:extLst>
-          </p:cNvPr>
-          <p:cNvSpPr txBox="1"/>
-          <p:nvPr/>
-        </p:nvSpPr>
-        <p:spPr>
-          <a:xfrm>
-            <a:off x="7457660" y="1388042"/>
-            <a:ext cx="3226905" cy="400110"/>
-          </a:xfrm>
-          <a:prstGeom prst="rect">
-            <a:avLst/>
-          </a:prstGeom>
-          <a:noFill/>
-        </p:spPr>
-        <p:txBody>
-          <a:bodyPr wrap="square" rtlCol="0">
-            <a:spAutoFit/>
-          </a:bodyPr>
-          <a:lstStyle/>
-          <a:p>
-            <a:pPr algn="ctr"/>
-            <a:r>
-              <a:rPr lang="pt-BR" sz="2000" b="1" dirty="0" err="1"/>
-              <a:t>HairTech</a:t>
-            </a:r>
-            <a:endParaRPr lang="pt-BR" sz="1400" b="1" dirty="0"/>
-          </a:p>
-        </p:txBody>
-      </p:sp>
-      <p:sp>
-        <p:nvSpPr>
-          <p:cNvPr id="7" name="Cubo 6">
-            <a:extLst>
-              <a:ext uri="{FF2B5EF4-FFF2-40B4-BE49-F238E27FC236}">
-                <a16:creationId xmlns:a16="http://schemas.microsoft.com/office/drawing/2014/main" xmlns="" id="{7CB94480-861D-47BC-8F39-38467A02CD1E}"/>
-              </a:ext>
-            </a:extLst>
-          </p:cNvPr>
-          <p:cNvSpPr/>
-          <p:nvPr/>
-        </p:nvSpPr>
-        <p:spPr>
-          <a:xfrm>
-            <a:off x="7911548" y="2199861"/>
-            <a:ext cx="2186609" cy="808382"/>
-          </a:xfrm>
-          <a:prstGeom prst="cube">
-            <a:avLst/>
-          </a:prstGeom>
-        </p:spPr>
-        <p:style>
-          <a:lnRef idx="1">
-            <a:schemeClr val="dk1"/>
-          </a:lnRef>
-          <a:fillRef idx="2">
-            <a:schemeClr val="dk1"/>
-          </a:fillRef>
-          <a:effectRef idx="1">
-            <a:schemeClr val="dk1"/>
-          </a:effectRef>
-          <a:fontRef idx="minor">
-            <a:schemeClr val="dk1"/>
-          </a:fontRef>
-        </p:style>
-        <p:txBody>
-          <a:bodyPr rtlCol="0" anchor="ctr"/>
-          <a:lstStyle/>
-          <a:p>
-            <a:pPr algn="ctr"/>
-            <a:r>
-              <a:rPr lang="pt-BR" sz="1600" b="1" dirty="0">
-                <a:solidFill>
-                  <a:schemeClr val="tx1">
-                    <a:lumMod val="95000"/>
-                    <a:lumOff val="5000"/>
-                  </a:schemeClr>
-                </a:solidFill>
-              </a:rPr>
-              <a:t>Cabelereiro</a:t>
-            </a:r>
-            <a:br>
-              <a:rPr lang="pt-BR" sz="1600" b="1" dirty="0">
-                <a:solidFill>
-                  <a:schemeClr val="tx1">
-                    <a:lumMod val="95000"/>
-                    <a:lumOff val="5000"/>
-                  </a:schemeClr>
-                </a:solidFill>
-              </a:rPr>
-            </a:br>
-            <a:r>
-              <a:rPr lang="pt-BR" sz="1600" b="1" dirty="0">
-                <a:solidFill>
-                  <a:schemeClr val="tx1">
-                    <a:lumMod val="95000"/>
-                    <a:lumOff val="5000"/>
-                  </a:schemeClr>
-                </a:solidFill>
-              </a:rPr>
-              <a:t>(Nó operacional)</a:t>
-            </a:r>
-          </a:p>
-        </p:txBody>
-      </p:sp>
-      <p:sp>
-        <p:nvSpPr>
-          <p:cNvPr id="8" name="Retângulo: Cantos Superiores Recortados 7">
-            <a:extLst>
-              <a:ext uri="{FF2B5EF4-FFF2-40B4-BE49-F238E27FC236}">
-                <a16:creationId xmlns:a16="http://schemas.microsoft.com/office/drawing/2014/main" xmlns="" id="{66ABF582-FC6C-4BC7-BEC3-0B92613B624C}"/>
-              </a:ext>
-            </a:extLst>
-          </p:cNvPr>
-          <p:cNvSpPr/>
-          <p:nvPr/>
-        </p:nvSpPr>
-        <p:spPr>
-          <a:xfrm>
-            <a:off x="7911548" y="4161183"/>
-            <a:ext cx="2186609" cy="808382"/>
-          </a:xfrm>
-          <a:prstGeom prst="snip2SameRect">
-            <a:avLst/>
-          </a:prstGeom>
-        </p:spPr>
-        <p:style>
-          <a:lnRef idx="1">
-            <a:schemeClr val="dk1"/>
-          </a:lnRef>
-          <a:fillRef idx="3">
-            <a:schemeClr val="dk1"/>
-          </a:fillRef>
-          <a:effectRef idx="2">
-            <a:schemeClr val="dk1"/>
-          </a:effectRef>
-          <a:fontRef idx="minor">
-            <a:schemeClr val="lt1"/>
-          </a:fontRef>
-        </p:style>
-        <p:txBody>
-          <a:bodyPr rtlCol="0" anchor="ctr"/>
-          <a:lstStyle/>
-          <a:p>
-            <a:pPr algn="ctr"/>
-            <a:r>
-              <a:rPr lang="pt-BR" sz="1600" b="1" dirty="0"/>
-              <a:t>Vender produtos</a:t>
-            </a:r>
-          </a:p>
-        </p:txBody>
-      </p:sp>
-      <p:cxnSp>
-        <p:nvCxnSpPr>
-          <p:cNvPr id="10" name="Conector reto 9">
-            <a:extLst>
-              <a:ext uri="{FF2B5EF4-FFF2-40B4-BE49-F238E27FC236}">
-                <a16:creationId xmlns:a16="http://schemas.microsoft.com/office/drawing/2014/main" xmlns="" id="{4AF25932-ADA8-46C6-B2BA-860A0C6900F9}"/>
-              </a:ext>
-            </a:extLst>
-          </p:cNvPr>
-          <p:cNvCxnSpPr>
-            <a:endCxn id="8" idx="3"/>
-          </p:cNvCxnSpPr>
-          <p:nvPr/>
-        </p:nvCxnSpPr>
-        <p:spPr>
-          <a:xfrm>
-            <a:off x="8998226" y="3008243"/>
-            <a:ext cx="6627" cy="1152940"/>
-          </a:xfrm>
-          <a:prstGeom prst="line">
-            <a:avLst/>
-          </a:prstGeom>
-        </p:spPr>
-        <p:style>
-          <a:lnRef idx="1">
-            <a:schemeClr val="dk1"/>
-          </a:lnRef>
-          <a:fillRef idx="0">
-            <a:schemeClr val="dk1"/>
-          </a:fillRef>
-          <a:effectRef idx="0">
-            <a:schemeClr val="dk1"/>
-          </a:effectRef>
-          <a:fontRef idx="minor">
-            <a:schemeClr val="tx1"/>
-          </a:fontRef>
-        </p:style>
-      </p:cxnSp>
-      <p:sp>
-        <p:nvSpPr>
-          <p:cNvPr id="11" name="Título 1">
-            <a:extLst>
-              <a:ext uri="{FF2B5EF4-FFF2-40B4-BE49-F238E27FC236}">
-                <a16:creationId xmlns:a16="http://schemas.microsoft.com/office/drawing/2014/main" xmlns="" id="{411917F5-2B7E-47D6-8EB7-3137A1AF18C2}"/>
-              </a:ext>
-            </a:extLst>
-          </p:cNvPr>
-          <p:cNvSpPr txBox="1">
-            <a:spLocks/>
-          </p:cNvSpPr>
-          <p:nvPr/>
-        </p:nvSpPr>
-        <p:spPr>
-          <a:xfrm>
-            <a:off x="4366591" y="348840"/>
-            <a:ext cx="3458817" cy="501720"/>
-          </a:xfrm>
-          <a:prstGeom prst="rect">
-            <a:avLst/>
-          </a:prstGeom>
-        </p:spPr>
-        <p:txBody>
-          <a:bodyPr>
-            <a:normAutofit fontScale="77500" lnSpcReduction="20000"/>
-          </a:bodyPr>
-          <a:lstStyle>
-            <a:lvl1pPr algn="l" defTabSz="914400" rtl="0" eaLnBrk="1" latinLnBrk="0" hangingPunct="1">
-              <a:lnSpc>
-                <a:spcPct val="90000"/>
-              </a:lnSpc>
-              <a:spcBef>
-                <a:spcPct val="0"/>
-              </a:spcBef>
-              <a:buNone/>
-              <a:defRPr sz="4400" kern="1200">
-                <a:solidFill>
-                  <a:schemeClr val="tx1"/>
-                </a:solidFill>
-                <a:latin typeface="+mj-lt"/>
-                <a:ea typeface="+mj-ea"/>
-                <a:cs typeface="+mj-cs"/>
-              </a:defRPr>
-            </a:lvl1pPr>
-          </a:lstStyle>
-          <a:p>
-            <a:pPr algn="ctr"/>
-            <a:r>
-              <a:rPr lang="pt-BR" sz="2800" b="1" dirty="0">
-                <a:latin typeface="+mn-lt"/>
-              </a:rPr>
-              <a:t>Cenário: </a:t>
-            </a:r>
-            <a:r>
-              <a:rPr lang="pt-BR" sz="2800" dirty="0"/>
-              <a:t>Comprar produtos</a:t>
-            </a:r>
-          </a:p>
-          <a:p>
-            <a:pPr algn="ctr"/>
-            <a:endParaRPr lang="pt-BR" sz="2800" b="1" dirty="0">
-              <a:latin typeface="+mn-lt"/>
-            </a:endParaRPr>
-          </a:p>
-        </p:txBody>
-      </p:sp>
-    </p:spTree>
-    <p:extLst>
-      <p:ext uri="{BB962C8B-B14F-4D97-AF65-F5344CB8AC3E}">
-        <p14:creationId xmlns:p14="http://schemas.microsoft.com/office/powerpoint/2010/main" val="2310034385"/>
-      </p:ext>
-    </p:extLst>
-  </p:cSld>
-  <p:clrMapOvr>
-    <a:masterClrMapping/>
-  </p:clrMapOvr>
-</p:sld>
-</file>
-
-<file path=ppt/slides/slide8.xml><?xml version="1.0" encoding="utf-8"?>
-<p:sld xmlns:a="http://schemas.openxmlformats.org/drawingml/2006/main" xmlns:r="http://schemas.openxmlformats.org/officeDocument/2006/relationships" xmlns:p="http://schemas.openxmlformats.org/presentationml/2006/main">
-  <p:cSld>
-    <p:spTree>
-      <p:nvGrpSpPr>
-        <p:cNvPr id="1" name=""/>
-        <p:cNvGrpSpPr/>
-        <p:nvPr/>
-      </p:nvGrpSpPr>
-      <p:grpSpPr>
-        <a:xfrm>
-          <a:off x="0" y="0"/>
-          <a:ext cx="0" cy="0"/>
-          <a:chOff x="0" y="0"/>
-          <a:chExt cx="0" cy="0"/>
-        </a:xfrm>
-      </p:grpSpPr>
-      <p:sp>
-        <p:nvSpPr>
-          <p:cNvPr id="2" name="Retângulo: Cantos Arredondados 1">
-            <a:extLst>
-              <a:ext uri="{FF2B5EF4-FFF2-40B4-BE49-F238E27FC236}">
-                <a16:creationId xmlns:a16="http://schemas.microsoft.com/office/drawing/2014/main" xmlns="" id="{71E86D7D-916F-498B-9151-1FC00881AA4A}"/>
-              </a:ext>
-            </a:extLst>
-          </p:cNvPr>
-          <p:cNvSpPr/>
-          <p:nvPr/>
-        </p:nvSpPr>
-        <p:spPr>
-          <a:xfrm>
-            <a:off x="6904383" y="1262269"/>
-            <a:ext cx="4333461" cy="4333461"/>
-          </a:xfrm>
-          <a:prstGeom prst="roundRect">
-            <a:avLst/>
-          </a:prstGeom>
-          <a:solidFill>
-            <a:schemeClr val="bg1">
-              <a:lumMod val="95000"/>
-            </a:schemeClr>
-          </a:solidFill>
-          <a:ln>
-            <a:solidFill>
-              <a:schemeClr val="tx1"/>
-            </a:solidFill>
-          </a:ln>
-        </p:spPr>
-        <p:style>
-          <a:lnRef idx="2">
-            <a:schemeClr val="accent1">
-              <a:shade val="50000"/>
-            </a:schemeClr>
-          </a:lnRef>
-          <a:fillRef idx="1">
-            <a:schemeClr val="accent1"/>
-          </a:fillRef>
-          <a:effectRef idx="0">
-            <a:schemeClr val="accent1"/>
-          </a:effectRef>
-          <a:fontRef idx="minor">
-            <a:schemeClr val="lt1"/>
-          </a:fontRef>
-        </p:style>
-        <p:txBody>
-          <a:bodyPr rtlCol="0" anchor="ctr"/>
-          <a:lstStyle/>
-          <a:p>
-            <a:pPr algn="ctr"/>
-            <a:endParaRPr lang="pt-BR" sz="2800" b="1" dirty="0">
-              <a:solidFill>
-                <a:schemeClr val="tx1">
-                  <a:lumMod val="95000"/>
-                  <a:lumOff val="5000"/>
-                </a:schemeClr>
-              </a:solidFill>
-            </a:endParaRPr>
-          </a:p>
-        </p:txBody>
-      </p:sp>
-      <p:cxnSp>
-        <p:nvCxnSpPr>
-          <p:cNvPr id="3" name="Conector reto 2">
-            <a:extLst>
-              <a:ext uri="{FF2B5EF4-FFF2-40B4-BE49-F238E27FC236}">
-                <a16:creationId xmlns:a16="http://schemas.microsoft.com/office/drawing/2014/main" xmlns="" id="{4212E35A-FE4C-44CD-B347-634311C873C1}"/>
-              </a:ext>
-            </a:extLst>
-          </p:cNvPr>
-          <p:cNvCxnSpPr>
-            <a:stCxn id="2" idx="1"/>
-          </p:cNvCxnSpPr>
-          <p:nvPr/>
-        </p:nvCxnSpPr>
-        <p:spPr>
-          <a:xfrm flipH="1" flipV="1">
-            <a:off x="3578087" y="3428999"/>
-            <a:ext cx="3326296" cy="1"/>
-          </a:xfrm>
-          <a:prstGeom prst="line">
-            <a:avLst/>
-          </a:prstGeom>
-        </p:spPr>
-        <p:style>
-          <a:lnRef idx="1">
-            <a:schemeClr val="dk1"/>
-          </a:lnRef>
-          <a:fillRef idx="0">
-            <a:schemeClr val="dk1"/>
-          </a:fillRef>
-          <a:effectRef idx="0">
-            <a:schemeClr val="dk1"/>
-          </a:effectRef>
-          <a:fontRef idx="minor">
-            <a:schemeClr val="tx1"/>
-          </a:fontRef>
-        </p:style>
-      </p:cxnSp>
-      <p:sp>
-        <p:nvSpPr>
-          <p:cNvPr id="4" name="Retângulo 3">
-            <a:extLst>
-              <a:ext uri="{FF2B5EF4-FFF2-40B4-BE49-F238E27FC236}">
-                <a16:creationId xmlns:a16="http://schemas.microsoft.com/office/drawing/2014/main" xmlns="" id="{A3F19016-7822-438C-9A2A-99580F97FBEA}"/>
-              </a:ext>
-            </a:extLst>
-          </p:cNvPr>
-          <p:cNvSpPr/>
-          <p:nvPr/>
-        </p:nvSpPr>
-        <p:spPr>
-          <a:xfrm>
-            <a:off x="1855304" y="2547729"/>
-            <a:ext cx="1762539" cy="1762539"/>
-          </a:xfrm>
-          <a:prstGeom prst="rect">
-            <a:avLst/>
-          </a:prstGeom>
-        </p:spPr>
-        <p:style>
-          <a:lnRef idx="1">
-            <a:schemeClr val="dk1"/>
-          </a:lnRef>
-          <a:fillRef idx="2">
-            <a:schemeClr val="dk1"/>
-          </a:fillRef>
-          <a:effectRef idx="1">
-            <a:schemeClr val="dk1"/>
-          </a:effectRef>
-          <a:fontRef idx="minor">
-            <a:schemeClr val="dk1"/>
-          </a:fontRef>
-        </p:style>
-        <p:txBody>
-          <a:bodyPr rtlCol="0" anchor="ctr"/>
-          <a:lstStyle/>
-          <a:p>
-            <a:pPr algn="ctr"/>
-            <a:r>
-              <a:rPr lang="pt-BR" sz="2500" b="1" dirty="0">
-                <a:solidFill>
-                  <a:schemeClr val="bg1"/>
-                </a:solidFill>
-              </a:rPr>
-              <a:t>Fornecedor</a:t>
-            </a:r>
-          </a:p>
-        </p:txBody>
-      </p:sp>
-      <p:sp>
-        <p:nvSpPr>
-          <p:cNvPr id="5" name="CaixaDeTexto 4">
-            <a:extLst>
-              <a:ext uri="{FF2B5EF4-FFF2-40B4-BE49-F238E27FC236}">
-                <a16:creationId xmlns:a16="http://schemas.microsoft.com/office/drawing/2014/main" xmlns="" id="{A88EB1D4-EA7B-4240-B245-D0093B79AE23}"/>
-              </a:ext>
-            </a:extLst>
-          </p:cNvPr>
-          <p:cNvSpPr txBox="1"/>
-          <p:nvPr/>
-        </p:nvSpPr>
-        <p:spPr>
-          <a:xfrm>
-            <a:off x="7457660" y="1388042"/>
-            <a:ext cx="3226905" cy="400110"/>
-          </a:xfrm>
-          <a:prstGeom prst="rect">
-            <a:avLst/>
-          </a:prstGeom>
-          <a:noFill/>
-        </p:spPr>
-        <p:txBody>
-          <a:bodyPr wrap="square" rtlCol="0">
-            <a:spAutoFit/>
-          </a:bodyPr>
-          <a:lstStyle/>
-          <a:p>
-            <a:pPr algn="ctr"/>
-            <a:r>
-              <a:rPr lang="pt-BR" sz="2000" b="1" dirty="0" err="1"/>
-              <a:t>HairTech</a:t>
-            </a:r>
-            <a:endParaRPr lang="pt-BR" sz="1400" b="1" dirty="0"/>
-          </a:p>
-        </p:txBody>
-      </p:sp>
-      <p:sp>
-        <p:nvSpPr>
-          <p:cNvPr id="7" name="Cubo 6">
-            <a:extLst>
-              <a:ext uri="{FF2B5EF4-FFF2-40B4-BE49-F238E27FC236}">
-                <a16:creationId xmlns:a16="http://schemas.microsoft.com/office/drawing/2014/main" xmlns="" id="{7CB94480-861D-47BC-8F39-38467A02CD1E}"/>
-              </a:ext>
-            </a:extLst>
-          </p:cNvPr>
-          <p:cNvSpPr/>
-          <p:nvPr/>
-        </p:nvSpPr>
-        <p:spPr>
-          <a:xfrm>
-            <a:off x="7911548" y="2199861"/>
-            <a:ext cx="2186609" cy="808382"/>
-          </a:xfrm>
-          <a:prstGeom prst="cube">
-            <a:avLst/>
-          </a:prstGeom>
-        </p:spPr>
-        <p:style>
-          <a:lnRef idx="1">
-            <a:schemeClr val="dk1"/>
-          </a:lnRef>
-          <a:fillRef idx="2">
-            <a:schemeClr val="dk1"/>
-          </a:fillRef>
-          <a:effectRef idx="1">
-            <a:schemeClr val="dk1"/>
-          </a:effectRef>
-          <a:fontRef idx="minor">
-            <a:schemeClr val="dk1"/>
-          </a:fontRef>
-        </p:style>
-        <p:txBody>
-          <a:bodyPr rtlCol="0" anchor="ctr"/>
-          <a:lstStyle/>
-          <a:p>
-            <a:pPr algn="ctr"/>
-            <a:r>
-              <a:rPr lang="pt-BR" sz="1600" b="1" dirty="0">
-                <a:solidFill>
-                  <a:schemeClr val="tx1">
-                    <a:lumMod val="95000"/>
-                    <a:lumOff val="5000"/>
-                  </a:schemeClr>
-                </a:solidFill>
-              </a:rPr>
-              <a:t>Compras</a:t>
-            </a:r>
-            <a:br>
-              <a:rPr lang="pt-BR" sz="1600" b="1" dirty="0">
-                <a:solidFill>
-                  <a:schemeClr val="tx1">
-                    <a:lumMod val="95000"/>
-                    <a:lumOff val="5000"/>
-                  </a:schemeClr>
-                </a:solidFill>
-              </a:rPr>
-            </a:br>
-            <a:r>
-              <a:rPr lang="pt-BR" sz="1600" b="1" dirty="0">
-                <a:solidFill>
-                  <a:schemeClr val="tx1">
-                    <a:lumMod val="95000"/>
-                    <a:lumOff val="5000"/>
-                  </a:schemeClr>
-                </a:solidFill>
-              </a:rPr>
-              <a:t>(Nó operacional)</a:t>
-            </a:r>
-          </a:p>
-        </p:txBody>
-      </p:sp>
-      <p:sp>
-        <p:nvSpPr>
-          <p:cNvPr id="8" name="Retângulo: Cantos Superiores Recortados 7">
-            <a:extLst>
-              <a:ext uri="{FF2B5EF4-FFF2-40B4-BE49-F238E27FC236}">
-                <a16:creationId xmlns:a16="http://schemas.microsoft.com/office/drawing/2014/main" xmlns="" id="{66ABF582-FC6C-4BC7-BEC3-0B92613B624C}"/>
-              </a:ext>
-            </a:extLst>
-          </p:cNvPr>
-          <p:cNvSpPr/>
-          <p:nvPr/>
-        </p:nvSpPr>
-        <p:spPr>
-          <a:xfrm>
-            <a:off x="7911548" y="4161183"/>
-            <a:ext cx="2186609" cy="808382"/>
-          </a:xfrm>
-          <a:prstGeom prst="snip2SameRect">
-            <a:avLst/>
-          </a:prstGeom>
-        </p:spPr>
-        <p:style>
-          <a:lnRef idx="1">
-            <a:schemeClr val="dk1"/>
-          </a:lnRef>
-          <a:fillRef idx="3">
-            <a:schemeClr val="dk1"/>
-          </a:fillRef>
-          <a:effectRef idx="2">
-            <a:schemeClr val="dk1"/>
-          </a:effectRef>
-          <a:fontRef idx="minor">
-            <a:schemeClr val="lt1"/>
-          </a:fontRef>
-        </p:style>
-        <p:txBody>
-          <a:bodyPr rtlCol="0" anchor="ctr"/>
-          <a:lstStyle/>
-          <a:p>
-            <a:pPr algn="ctr"/>
-            <a:r>
-              <a:rPr lang="pt-BR" sz="1600" b="1" dirty="0"/>
-              <a:t>Comprar produtos</a:t>
-            </a:r>
-          </a:p>
-        </p:txBody>
-      </p:sp>
-      <p:cxnSp>
-        <p:nvCxnSpPr>
-          <p:cNvPr id="10" name="Conector reto 9">
-            <a:extLst>
-              <a:ext uri="{FF2B5EF4-FFF2-40B4-BE49-F238E27FC236}">
-                <a16:creationId xmlns:a16="http://schemas.microsoft.com/office/drawing/2014/main" xmlns="" id="{4AF25932-ADA8-46C6-B2BA-860A0C6900F9}"/>
-              </a:ext>
-            </a:extLst>
-          </p:cNvPr>
-          <p:cNvCxnSpPr>
-            <a:endCxn id="8" idx="3"/>
-          </p:cNvCxnSpPr>
-          <p:nvPr/>
-        </p:nvCxnSpPr>
-        <p:spPr>
-          <a:xfrm>
-            <a:off x="8998226" y="3008243"/>
-            <a:ext cx="6627" cy="1152940"/>
-          </a:xfrm>
-          <a:prstGeom prst="line">
-            <a:avLst/>
-          </a:prstGeom>
-        </p:spPr>
-        <p:style>
-          <a:lnRef idx="1">
-            <a:schemeClr val="dk1"/>
-          </a:lnRef>
-          <a:fillRef idx="0">
-            <a:schemeClr val="dk1"/>
-          </a:fillRef>
-          <a:effectRef idx="0">
-            <a:schemeClr val="dk1"/>
-          </a:effectRef>
-          <a:fontRef idx="minor">
-            <a:schemeClr val="tx1"/>
-          </a:fontRef>
-        </p:style>
-      </p:cxnSp>
-      <p:sp>
-        <p:nvSpPr>
-          <p:cNvPr id="11" name="Título 1">
-            <a:extLst>
-              <a:ext uri="{FF2B5EF4-FFF2-40B4-BE49-F238E27FC236}">
-                <a16:creationId xmlns:a16="http://schemas.microsoft.com/office/drawing/2014/main" xmlns="" id="{411917F5-2B7E-47D6-8EB7-3137A1AF18C2}"/>
-              </a:ext>
-            </a:extLst>
-          </p:cNvPr>
-          <p:cNvSpPr txBox="1">
-            <a:spLocks/>
-          </p:cNvSpPr>
-          <p:nvPr/>
-        </p:nvSpPr>
-        <p:spPr>
-          <a:xfrm>
-            <a:off x="4366591" y="348840"/>
-            <a:ext cx="3458817" cy="501720"/>
-          </a:xfrm>
-          <a:prstGeom prst="rect">
-            <a:avLst/>
-          </a:prstGeom>
-        </p:spPr>
-        <p:txBody>
-          <a:bodyPr>
-            <a:normAutofit fontScale="85000" lnSpcReduction="10000"/>
-          </a:bodyPr>
-          <a:lstStyle>
-            <a:lvl1pPr algn="l" defTabSz="914400" rtl="0" eaLnBrk="1" latinLnBrk="0" hangingPunct="1">
-              <a:lnSpc>
-                <a:spcPct val="90000"/>
-              </a:lnSpc>
-              <a:spcBef>
-                <a:spcPct val="0"/>
-              </a:spcBef>
-              <a:buNone/>
-              <a:defRPr sz="4400" kern="1200">
-                <a:solidFill>
-                  <a:schemeClr val="tx1"/>
-                </a:solidFill>
-                <a:latin typeface="+mj-lt"/>
-                <a:ea typeface="+mj-ea"/>
-                <a:cs typeface="+mj-cs"/>
-              </a:defRPr>
-            </a:lvl1pPr>
-          </a:lstStyle>
-          <a:p>
-            <a:pPr algn="ctr"/>
-            <a:r>
-              <a:rPr lang="pt-BR" sz="2800" b="1" dirty="0">
-                <a:latin typeface="+mn-lt"/>
-              </a:rPr>
-              <a:t>Cenário: </a:t>
-            </a:r>
-            <a:r>
-              <a:rPr lang="pt-BR" sz="2800" dirty="0"/>
-              <a:t>Vender produtos</a:t>
-            </a:r>
-          </a:p>
-          <a:p>
-            <a:pPr algn="ctr"/>
-            <a:endParaRPr lang="pt-BR" sz="2800" b="1" dirty="0">
-              <a:latin typeface="+mn-lt"/>
-            </a:endParaRPr>
-          </a:p>
-        </p:txBody>
-      </p:sp>
-      <mc:AlternateContent xmlns:mc="http://schemas.openxmlformats.org/markup-compatibility/2006" xmlns:p14="http://schemas.microsoft.com/office/powerpoint/2010/main">
-        <mc:Choice Requires="p14">
-          <p:contentPart p14:bwMode="auto" r:id="rId2">
-            <p14:nvContentPartPr>
-              <p14:cNvPr id="6" name="Tinta 5">
-                <a:extLst>
-                  <a:ext uri="{FF2B5EF4-FFF2-40B4-BE49-F238E27FC236}">
-                    <a16:creationId xmlns:a16="http://schemas.microsoft.com/office/drawing/2014/main" xmlns="" id="{6AEB5FE6-FB39-4F8B-A5DF-94E3DBA96C85}"/>
-                  </a:ext>
-                </a:extLst>
-              </p14:cNvPr>
-              <p14:cNvContentPartPr/>
-              <p14:nvPr/>
-            </p14:nvContentPartPr>
-            <p14:xfrm>
-              <a:off x="2968401" y="4904350"/>
-              <a:ext cx="360" cy="360"/>
-            </p14:xfrm>
-          </p:contentPart>
-        </mc:Choice>
-        <mc:Fallback xmlns="">
-          <p:pic>
-            <p:nvPicPr>
-              <p:cNvPr id="6" name="Tinta 5">
-                <a:extLst>
-                  <a:ext uri="{FF2B5EF4-FFF2-40B4-BE49-F238E27FC236}">
-                    <a16:creationId xmlns:a16="http://schemas.microsoft.com/office/drawing/2014/main" id="{6AEB5FE6-FB39-4F8B-A5DF-94E3DBA96C85}"/>
-                  </a:ext>
-                </a:extLst>
-              </p:cNvPr>
-              <p:cNvPicPr/>
-              <p:nvPr/>
-            </p:nvPicPr>
-            <p:blipFill>
-              <a:blip r:embed="rId3"/>
-              <a:stretch>
-                <a:fillRect/>
-              </a:stretch>
-            </p:blipFill>
-            <p:spPr>
-              <a:xfrm>
-                <a:off x="2959401" y="4895350"/>
-                <a:ext cx="18000" cy="18000"/>
-              </a:xfrm>
-              <a:prstGeom prst="rect">
-                <a:avLst/>
-              </a:prstGeom>
-            </p:spPr>
-          </p:pic>
-        </mc:Fallback>
-      </mc:AlternateContent>
-    </p:spTree>
-    <p:extLst>
-      <p:ext uri="{BB962C8B-B14F-4D97-AF65-F5344CB8AC3E}">
-        <p14:creationId xmlns:p14="http://schemas.microsoft.com/office/powerpoint/2010/main" val="2664372873"/>
       </p:ext>
     </p:extLst>
   </p:cSld>

</xml_diff>